<commit_message>
completed the slides, script, and recording with all the completed implementation of feedback
</commit_message>
<xml_diff>
--- a/hw1/slides.pptx
+++ b/hw1/slides.pptx
@@ -20,7 +20,7 @@
     <p:sldId id="273" r:id="rId11"/>
     <p:sldId id="274" r:id="rId12"/>
     <p:sldId id="275" r:id="rId13"/>
-    <p:sldId id="277" r:id="rId14"/>
+    <p:sldId id="280" r:id="rId14"/>
     <p:sldId id="268" r:id="rId15"/>
     <p:sldId id="278" r:id="rId16"/>
     <p:sldId id="269" r:id="rId17"/>
@@ -13634,7 +13634,7 @@
           <a:p>
             <a:fld id="{21B4EBA7-011D-1E45-8169-29AE3AFDA16A}" type="datetimeFigureOut">
               <a:rPr lang="en-US" smtClean="0"/>
-              <a:t>4/19/25</a:t>
+              <a:t>4/20/25</a:t>
             </a:fld>
             <a:endParaRPr lang="en-US"/>
           </a:p>
@@ -14798,6 +14798,9 @@
               <a:t>So if your friends do not have a strong disapproval for marijuana use, your mother is not present in the household, and you are female, then our model predicts that you have used marijuana for around 102 days in the past year.</a:t>
             </a:r>
           </a:p>
+          <a:p>
+            <a:endParaRPr lang="en-US" dirty="0"/>
+          </a:p>
         </p:txBody>
       </p:sp>
       <p:sp>
@@ -14826,7 +14829,7 @@
     </p:spTree>
     <p:extLst>
       <p:ext uri="{BB962C8B-B14F-4D97-AF65-F5344CB8AC3E}">
-        <p14:creationId xmlns:p14="http://schemas.microsoft.com/office/powerpoint/2010/main" val="3451741222"/>
+        <p14:creationId xmlns:p14="http://schemas.microsoft.com/office/powerpoint/2010/main" val="1820638502"/>
       </p:ext>
     </p:extLst>
   </p:cSld>
@@ -15160,7 +15163,7 @@
           <a:p>
             <a:fld id="{2569756D-5336-064F-995F-F3CE35658738}" type="datetime1">
               <a:rPr lang="en-US" smtClean="0"/>
-              <a:t>4/19/25</a:t>
+              <a:t>4/20/25</a:t>
             </a:fld>
             <a:endParaRPr lang="en-US"/>
           </a:p>
@@ -15360,7 +15363,7 @@
           <a:p>
             <a:fld id="{3C423B5E-3683-0549-A9EA-3F6ED104A775}" type="datetime1">
               <a:rPr lang="en-US" smtClean="0"/>
-              <a:t>4/19/25</a:t>
+              <a:t>4/20/25</a:t>
             </a:fld>
             <a:endParaRPr lang="en-US"/>
           </a:p>
@@ -15619,7 +15622,7 @@
           <a:p>
             <a:fld id="{8F2E49C1-4ED4-8040-9F08-CB6847E0456F}" type="datetime1">
               <a:rPr lang="en-US" smtClean="0"/>
-              <a:t>4/19/25</a:t>
+              <a:t>4/20/25</a:t>
             </a:fld>
             <a:endParaRPr lang="en-US"/>
           </a:p>
@@ -15860,7 +15863,7 @@
           <a:p>
             <a:fld id="{22DC6F78-82FE-0148-8742-207988C0AD35}" type="datetime1">
               <a:rPr lang="en-US" smtClean="0"/>
-              <a:t>4/19/25</a:t>
+              <a:t>4/20/25</a:t>
             </a:fld>
             <a:endParaRPr lang="en-US"/>
           </a:p>
@@ -16187,7 +16190,7 @@
           <a:p>
             <a:fld id="{4173938F-DC7E-FE45-B39E-24E7EF7E7AD3}" type="datetime1">
               <a:rPr lang="en-US" smtClean="0"/>
-              <a:t>4/19/25</a:t>
+              <a:t>4/20/25</a:t>
             </a:fld>
             <a:endParaRPr lang="en-US"/>
           </a:p>
@@ -16497,7 +16500,7 @@
           <a:p>
             <a:fld id="{7CFD97BB-C48A-DC4C-BC32-0E2DC73FBF6F}" type="datetime1">
               <a:rPr lang="en-US" smtClean="0"/>
-              <a:t>4/19/25</a:t>
+              <a:t>4/20/25</a:t>
             </a:fld>
             <a:endParaRPr lang="en-US"/>
           </a:p>
@@ -16915,7 +16918,7 @@
           <a:p>
             <a:fld id="{7E267486-A2B2-6845-A236-84D356BA576A}" type="datetime1">
               <a:rPr lang="en-US" smtClean="0"/>
-              <a:t>4/19/25</a:t>
+              <a:t>4/20/25</a:t>
             </a:fld>
             <a:endParaRPr lang="en-US"/>
           </a:p>
@@ -17057,7 +17060,7 @@
           <a:p>
             <a:fld id="{8548AC95-AC85-D946-AFB2-1924602F50E8}" type="datetime1">
               <a:rPr lang="en-US" smtClean="0"/>
-              <a:t>4/19/25</a:t>
+              <a:t>4/20/25</a:t>
             </a:fld>
             <a:endParaRPr lang="en-US"/>
           </a:p>
@@ -17219,7 +17222,7 @@
           <a:p>
             <a:fld id="{1A0D6FE4-87B2-104A-B641-5A8E48C9B5A6}" type="datetime1">
               <a:rPr lang="en-US" smtClean="0"/>
-              <a:t>4/19/25</a:t>
+              <a:t>4/20/25</a:t>
             </a:fld>
             <a:endParaRPr lang="en-US"/>
           </a:p>
@@ -17536,7 +17539,7 @@
           <a:p>
             <a:fld id="{2E6D4B36-D401-8A49-BD59-ECA5E99A15A9}" type="datetime1">
               <a:rPr lang="en-US" smtClean="0"/>
-              <a:t>4/19/25</a:t>
+              <a:t>4/20/25</a:t>
             </a:fld>
             <a:endParaRPr lang="en-US"/>
           </a:p>
@@ -17831,7 +17834,7 @@
           <a:p>
             <a:fld id="{260DDC9A-BCEE-7444-B6B8-7A73C78E1667}" type="datetime1">
               <a:rPr lang="en-US" smtClean="0"/>
-              <a:t>4/19/25</a:t>
+              <a:t>4/20/25</a:t>
             </a:fld>
             <a:endParaRPr lang="en-US"/>
           </a:p>
@@ -18072,7 +18075,7 @@
           <a:p>
             <a:fld id="{7793A318-8EA3-BB45-90BE-A95E768A7FF6}" type="datetime1">
               <a:rPr lang="en-US" smtClean="0"/>
-              <a:t>4/19/25</a:t>
+              <a:t>4/20/25</a:t>
             </a:fld>
             <a:endParaRPr lang="en-US"/>
           </a:p>
@@ -20006,14 +20009,6 @@
 <file path=ppt/slides/slide13.xml><?xml version="1.0" encoding="utf-8"?>
 <p:sld xmlns:a="http://schemas.openxmlformats.org/drawingml/2006/main" xmlns:r="http://schemas.openxmlformats.org/officeDocument/2006/relationships" xmlns:p="http://schemas.openxmlformats.org/presentationml/2006/main">
   <p:cSld>
-    <p:bg>
-      <p:bgPr>
-        <a:solidFill>
-          <a:schemeClr val="bg1"/>
-        </a:solidFill>
-        <a:effectLst/>
-      </p:bgPr>
-    </p:bg>
     <p:spTree>
       <p:nvGrpSpPr>
         <p:cNvPr id="1" name=""/>
@@ -20028,88 +20023,61 @@
           <a:chExt cx="0" cy="0"/>
         </a:xfrm>
       </p:grpSpPr>
-      <p:cxnSp>
-        <p:nvCxnSpPr>
-          <p:cNvPr id="24" name="Straight Connector 23">
+      <p:sp>
+        <p:nvSpPr>
+          <p:cNvPr id="2" name="Slide Number Placeholder 1">
             <a:extLst>
               <a:ext uri="{FF2B5EF4-FFF2-40B4-BE49-F238E27FC236}">
-                <a16:creationId xmlns:a16="http://schemas.microsoft.com/office/drawing/2014/main" id="{118E06E4-607B-144B-382B-AD3D06B1EE8C}"/>
-              </a:ext>
-              <a:ext uri="{C183D7F6-B498-43B3-948B-1728B52AA6E4}">
-                <adec:decorative xmlns:adec="http://schemas.microsoft.com/office/drawing/2017/decorative" val="1"/>
-              </a:ext>
-            </a:extLst>
-          </p:cNvPr>
-          <p:cNvCxnSpPr>
-            <a:cxnSpLocks noGrp="1" noRot="1" noChangeAspect="1" noMove="1" noResize="1" noEditPoints="1" noAdjustHandles="1" noChangeArrowheads="1" noChangeShapeType="1"/>
-          </p:cNvCxnSpPr>
-          <p:nvPr>
-            <p:extLst>
-              <p:ext uri="{386F3935-93C4-4BCD-93E2-E3B085C9AB24}">
-                <p16:designElem xmlns:p16="http://schemas.microsoft.com/office/powerpoint/2015/main" val="1"/>
-              </p:ext>
-            </p:extLst>
-          </p:nvPr>
-        </p:nvCxnSpPr>
-        <p:spPr>
-          <a:xfrm>
-            <a:off x="713232" y="1031001"/>
-            <a:ext cx="978862" cy="0"/>
-          </a:xfrm>
-          <a:prstGeom prst="line">
-            <a:avLst/>
-          </a:prstGeom>
-          <a:ln w="76200"/>
-        </p:spPr>
-        <p:style>
-          <a:lnRef idx="1">
-            <a:schemeClr val="accent1"/>
-          </a:lnRef>
-          <a:fillRef idx="0">
-            <a:schemeClr val="accent1"/>
-          </a:fillRef>
-          <a:effectRef idx="0">
-            <a:schemeClr val="accent1"/>
-          </a:effectRef>
-          <a:fontRef idx="minor">
-            <a:schemeClr val="tx1"/>
-          </a:fontRef>
-        </p:style>
-      </p:cxnSp>
-      <p:sp useBgFill="1">
-        <p:nvSpPr>
-          <p:cNvPr id="26" name="Rectangle 25">
-            <a:extLst>
-              <a:ext uri="{FF2B5EF4-FFF2-40B4-BE49-F238E27FC236}">
-                <a16:creationId xmlns:a16="http://schemas.microsoft.com/office/drawing/2014/main" id="{149F9F0F-FB8C-5565-247C-BDCC156B5CAF}"/>
-              </a:ext>
-              <a:ext uri="{C183D7F6-B498-43B3-948B-1728B52AA6E4}">
-                <adec:decorative xmlns:adec="http://schemas.microsoft.com/office/drawing/2017/decorative" val="1"/>
+                <a16:creationId xmlns:a16="http://schemas.microsoft.com/office/drawing/2014/main" id="{5CF398B2-1426-D1C5-6559-833D924EA6B7}"/>
               </a:ext>
             </a:extLst>
           </p:cNvPr>
           <p:cNvSpPr>
-            <a:spLocks noGrp="1" noRot="1" noChangeAspect="1" noMove="1" noResize="1" noEditPoints="1" noAdjustHandles="1" noChangeArrowheads="1" noChangeShapeType="1" noTextEdit="1"/>
+            <a:spLocks noGrp="1"/>
           </p:cNvSpPr>
           <p:nvPr>
-            <p:extLst>
-              <p:ext uri="{386F3935-93C4-4BCD-93E2-E3B085C9AB24}">
-                <p16:designElem xmlns:p16="http://schemas.microsoft.com/office/powerpoint/2015/main" val="1"/>
-              </p:ext>
-            </p:extLst>
+            <p:ph type="sldNum" sz="quarter" idx="12"/>
           </p:nvPr>
+        </p:nvSpPr>
+        <p:spPr/>
+        <p:txBody>
+          <a:bodyPr/>
+          <a:lstStyle/>
+          <a:p>
+            <a:fld id="{70C12960-6E85-460F-B6E3-5B82CB31AF3D}" type="slidenum">
+              <a:rPr lang="en-US" smtClean="0"/>
+              <a:t>13</a:t>
+            </a:fld>
+            <a:endParaRPr lang="en-US"/>
+          </a:p>
+        </p:txBody>
+      </p:sp>
+      <p:sp>
+        <p:nvSpPr>
+          <p:cNvPr id="8" name="Rounded Rectangle 7">
+            <a:extLst>
+              <a:ext uri="{FF2B5EF4-FFF2-40B4-BE49-F238E27FC236}">
+                <a16:creationId xmlns:a16="http://schemas.microsoft.com/office/drawing/2014/main" id="{C2D66622-3050-5FF0-A77E-AB1CD42592C1}"/>
+              </a:ext>
+            </a:extLst>
+          </p:cNvPr>
+          <p:cNvSpPr/>
+          <p:nvPr/>
         </p:nvSpPr>
         <p:spPr>
           <a:xfrm>
-            <a:off x="0" y="0"/>
-            <a:ext cx="12192000" cy="6858000"/>
+            <a:off x="9186813" y="3678711"/>
+            <a:ext cx="2227634" cy="982494"/>
           </a:xfrm>
-          <a:prstGeom prst="rect">
+          <a:prstGeom prst="roundRect">
             <a:avLst/>
           </a:prstGeom>
-          <a:ln>
-            <a:noFill/>
-          </a:ln>
+          <a:solidFill>
+            <a:schemeClr val="accent1">
+              <a:lumMod val="20000"/>
+              <a:lumOff val="80000"/>
+            </a:schemeClr>
+          </a:solidFill>
         </p:spPr>
         <p:style>
           <a:lnRef idx="2">
@@ -20136,122 +20104,32 @@
           </a:p>
         </p:txBody>
       </p:sp>
-      <p:sp useBgFill="1">
+      <p:sp>
         <p:nvSpPr>
-          <p:cNvPr id="28" name="Rectangle 27">
+          <p:cNvPr id="9" name="Rounded Rectangle 8">
             <a:extLst>
               <a:ext uri="{FF2B5EF4-FFF2-40B4-BE49-F238E27FC236}">
-                <a16:creationId xmlns:a16="http://schemas.microsoft.com/office/drawing/2014/main" id="{ABA4FDDF-F59C-428B-8603-3A86D75931AB}"/>
-              </a:ext>
-              <a:ext uri="{C183D7F6-B498-43B3-948B-1728B52AA6E4}">
-                <adec:decorative xmlns:adec="http://schemas.microsoft.com/office/drawing/2017/decorative" val="1"/>
+                <a16:creationId xmlns:a16="http://schemas.microsoft.com/office/drawing/2014/main" id="{85EBF71E-90D1-0106-04A3-617DC49E5FC4}"/>
               </a:ext>
             </a:extLst>
           </p:cNvPr>
-          <p:cNvSpPr>
-            <a:spLocks noGrp="1" noRot="1" noChangeAspect="1" noMove="1" noResize="1" noEditPoints="1" noAdjustHandles="1" noChangeArrowheads="1" noChangeShapeType="1" noTextEdit="1"/>
-          </p:cNvSpPr>
-          <p:nvPr>
-            <p:extLst>
-              <p:ext uri="{386F3935-93C4-4BCD-93E2-E3B085C9AB24}">
-                <p16:designElem xmlns:p16="http://schemas.microsoft.com/office/powerpoint/2015/main" val="1"/>
-              </p:ext>
-            </p:extLst>
-          </p:nvPr>
+          <p:cNvSpPr/>
+          <p:nvPr/>
         </p:nvSpPr>
         <p:spPr>
           <a:xfrm>
-            <a:off x="0" y="0"/>
-            <a:ext cx="12192000" cy="6858000"/>
+            <a:off x="6448776" y="3678711"/>
+            <a:ext cx="2227634" cy="982494"/>
           </a:xfrm>
-          <a:prstGeom prst="rect">
-            <a:avLst/>
-          </a:prstGeom>
-          <a:ln w="12700" cap="flat" cmpd="sng" algn="ctr">
-            <a:noFill/>
-            <a:prstDash val="solid"/>
-            <a:miter lim="800000"/>
-          </a:ln>
-          <a:effectLst/>
-          <a:extLst>
-            <a:ext uri="{91240B29-F687-4F45-9708-019B960494DF}">
-              <a14:hiddenLine xmlns:a14="http://schemas.microsoft.com/office/drawing/2010/main" w="12700" cap="flat" cmpd="sng" algn="ctr">
-                <a:solidFill>
-                  <a:schemeClr val="accent1">
-                    <a:shade val="50000"/>
-                  </a:schemeClr>
-                </a:solidFill>
-                <a:prstDash val="solid"/>
-                <a:miter lim="800000"/>
-              </a14:hiddenLine>
-            </a:ext>
-          </a:extLst>
-        </p:spPr>
-        <p:style>
-          <a:lnRef idx="2">
-            <a:schemeClr val="accent1">
-              <a:shade val="50000"/>
-            </a:schemeClr>
-          </a:lnRef>
-          <a:fillRef idx="1">
-            <a:schemeClr val="accent1"/>
-          </a:fillRef>
-          <a:effectRef idx="0">
-            <a:schemeClr val="accent1"/>
-          </a:effectRef>
-          <a:fontRef idx="minor">
-            <a:schemeClr val="lt1"/>
-          </a:fontRef>
-        </p:style>
-        <p:txBody>
-          <a:bodyPr rtlCol="0" anchor="ctr"/>
-          <a:lstStyle/>
-          <a:p>
-            <a:pPr algn="ctr"/>
-            <a:endParaRPr lang="en-US"/>
-          </a:p>
-        </p:txBody>
-      </p:sp>
-      <p:sp>
-        <p:nvSpPr>
-          <p:cNvPr id="30" name="Rectangle 29">
-            <a:extLst>
-              <a:ext uri="{FF2B5EF4-FFF2-40B4-BE49-F238E27FC236}">
-                <a16:creationId xmlns:a16="http://schemas.microsoft.com/office/drawing/2014/main" id="{3701323A-3BD4-99D2-F90B-51E5AB342D48}"/>
-              </a:ext>
-              <a:ext uri="{C183D7F6-B498-43B3-948B-1728B52AA6E4}">
-                <adec:decorative xmlns:adec="http://schemas.microsoft.com/office/drawing/2017/decorative" val="1"/>
-              </a:ext>
-            </a:extLst>
-          </p:cNvPr>
-          <p:cNvSpPr>
-            <a:spLocks noGrp="1" noRot="1" noChangeAspect="1" noMove="1" noResize="1" noEditPoints="1" noAdjustHandles="1" noChangeArrowheads="1" noChangeShapeType="1" noTextEdit="1"/>
-          </p:cNvSpPr>
-          <p:nvPr>
-            <p:extLst>
-              <p:ext uri="{386F3935-93C4-4BCD-93E2-E3B085C9AB24}">
-                <p16:designElem xmlns:p16="http://schemas.microsoft.com/office/powerpoint/2015/main" val="1"/>
-              </p:ext>
-            </p:extLst>
-          </p:nvPr>
-        </p:nvSpPr>
-        <p:spPr>
-          <a:xfrm>
-            <a:off x="643467" y="640311"/>
-            <a:ext cx="10887542" cy="5577378"/>
-          </a:xfrm>
-          <a:prstGeom prst="rect">
+          <a:prstGeom prst="roundRect">
             <a:avLst/>
           </a:prstGeom>
           <a:solidFill>
-            <a:schemeClr val="bg1">
-              <a:lumMod val="95000"/>
-              <a:alpha val="60000"/>
+            <a:schemeClr val="accent1">
+              <a:lumMod val="20000"/>
+              <a:lumOff val="80000"/>
             </a:schemeClr>
           </a:solidFill>
-          <a:ln>
-            <a:noFill/>
-          </a:ln>
         </p:spPr>
         <p:style>
           <a:lnRef idx="2">
@@ -20278,69 +20156,1546 @@
           </a:p>
         </p:txBody>
       </p:sp>
-      <p:pic>
-        <p:nvPicPr>
-          <p:cNvPr id="6" name="Content Placeholder 5" descr="A diagram of a group of people&#10;&#10;AI-generated content may be incorrect.">
+      <p:sp>
+        <p:nvSpPr>
+          <p:cNvPr id="10" name="Rounded Rectangle 9">
             <a:extLst>
               <a:ext uri="{FF2B5EF4-FFF2-40B4-BE49-F238E27FC236}">
-                <a16:creationId xmlns:a16="http://schemas.microsoft.com/office/drawing/2014/main" id="{51F4EF02-F644-3519-AECF-B9255CD4573A}"/>
+                <a16:creationId xmlns:a16="http://schemas.microsoft.com/office/drawing/2014/main" id="{7EA64377-A264-DEAC-2804-96FA41B5ADE0}"/>
               </a:ext>
             </a:extLst>
           </p:cNvPr>
-          <p:cNvPicPr>
-            <a:picLocks noGrp="1" noChangeAspect="1"/>
-          </p:cNvPicPr>
-          <p:nvPr>
-            <p:ph idx="1"/>
-          </p:nvPr>
-        </p:nvPicPr>
-        <p:blipFill>
-          <a:blip r:embed="rId3"/>
-          <a:srcRect t="627"/>
-          <a:stretch/>
-        </p:blipFill>
+          <p:cNvSpPr/>
+          <p:nvPr/>
+        </p:nvSpPr>
         <p:spPr>
           <a:xfrm>
-            <a:off x="643467" y="640311"/>
-            <a:ext cx="10902365" cy="5579514"/>
+            <a:off x="3594369" y="3531760"/>
+            <a:ext cx="2344003" cy="1129445"/>
+          </a:xfrm>
+          <a:prstGeom prst="roundRect">
+            <a:avLst/>
+          </a:prstGeom>
+          <a:solidFill>
+            <a:schemeClr val="accent1">
+              <a:lumMod val="20000"/>
+              <a:lumOff val="80000"/>
+            </a:schemeClr>
+          </a:solidFill>
+        </p:spPr>
+        <p:style>
+          <a:lnRef idx="2">
+            <a:schemeClr val="accent1">
+              <a:shade val="15000"/>
+            </a:schemeClr>
+          </a:lnRef>
+          <a:fillRef idx="1">
+            <a:schemeClr val="accent1"/>
+          </a:fillRef>
+          <a:effectRef idx="0">
+            <a:schemeClr val="accent1"/>
+          </a:effectRef>
+          <a:fontRef idx="minor">
+            <a:schemeClr val="lt1"/>
+          </a:fontRef>
+        </p:style>
+        <p:txBody>
+          <a:bodyPr rtlCol="0" anchor="ctr"/>
+          <a:lstStyle/>
+          <a:p>
+            <a:pPr algn="ctr"/>
+            <a:endParaRPr lang="en-US"/>
+          </a:p>
+        </p:txBody>
+      </p:sp>
+      <p:sp>
+        <p:nvSpPr>
+          <p:cNvPr id="11" name="Rounded Rectangle 10">
+            <a:extLst>
+              <a:ext uri="{FF2B5EF4-FFF2-40B4-BE49-F238E27FC236}">
+                <a16:creationId xmlns:a16="http://schemas.microsoft.com/office/drawing/2014/main" id="{6538926E-B9E5-5238-52CD-505A101422F7}"/>
+              </a:ext>
+            </a:extLst>
+          </p:cNvPr>
+          <p:cNvSpPr/>
+          <p:nvPr/>
+        </p:nvSpPr>
+        <p:spPr>
+          <a:xfrm>
+            <a:off x="777553" y="3678711"/>
+            <a:ext cx="2227634" cy="982494"/>
+          </a:xfrm>
+          <a:prstGeom prst="roundRect">
+            <a:avLst/>
+          </a:prstGeom>
+          <a:solidFill>
+            <a:schemeClr val="accent1">
+              <a:lumMod val="20000"/>
+              <a:lumOff val="80000"/>
+            </a:schemeClr>
+          </a:solidFill>
+        </p:spPr>
+        <p:style>
+          <a:lnRef idx="2">
+            <a:schemeClr val="accent1">
+              <a:shade val="15000"/>
+            </a:schemeClr>
+          </a:lnRef>
+          <a:fillRef idx="1">
+            <a:schemeClr val="accent1"/>
+          </a:fillRef>
+          <a:effectRef idx="0">
+            <a:schemeClr val="accent1"/>
+          </a:effectRef>
+          <a:fontRef idx="minor">
+            <a:schemeClr val="lt1"/>
+          </a:fontRef>
+        </p:style>
+        <p:txBody>
+          <a:bodyPr rtlCol="0" anchor="ctr"/>
+          <a:lstStyle/>
+          <a:p>
+            <a:pPr algn="ctr"/>
+            <a:endParaRPr lang="en-US"/>
+          </a:p>
+        </p:txBody>
+      </p:sp>
+      <p:sp>
+        <p:nvSpPr>
+          <p:cNvPr id="16" name="Rounded Rectangle 15">
+            <a:extLst>
+              <a:ext uri="{FF2B5EF4-FFF2-40B4-BE49-F238E27FC236}">
+                <a16:creationId xmlns:a16="http://schemas.microsoft.com/office/drawing/2014/main" id="{B14F0A84-BA1B-1FDB-EBCC-C14A9EA0A264}"/>
+              </a:ext>
+            </a:extLst>
+          </p:cNvPr>
+          <p:cNvSpPr/>
+          <p:nvPr/>
+        </p:nvSpPr>
+        <p:spPr>
+          <a:xfrm>
+            <a:off x="9190584" y="5388713"/>
+            <a:ext cx="886518" cy="945880"/>
+          </a:xfrm>
+          <a:prstGeom prst="roundRect">
+            <a:avLst/>
+          </a:prstGeom>
+          <a:solidFill>
+            <a:schemeClr val="accent1">
+              <a:lumMod val="20000"/>
+              <a:lumOff val="80000"/>
+            </a:schemeClr>
+          </a:solidFill>
+        </p:spPr>
+        <p:style>
+          <a:lnRef idx="2">
+            <a:schemeClr val="accent1">
+              <a:shade val="15000"/>
+            </a:schemeClr>
+          </a:lnRef>
+          <a:fillRef idx="1">
+            <a:schemeClr val="accent1"/>
+          </a:fillRef>
+          <a:effectRef idx="0">
+            <a:schemeClr val="accent1"/>
+          </a:effectRef>
+          <a:fontRef idx="minor">
+            <a:schemeClr val="lt1"/>
+          </a:fontRef>
+        </p:style>
+        <p:txBody>
+          <a:bodyPr rtlCol="0" anchor="ctr"/>
+          <a:lstStyle/>
+          <a:p>
+            <a:pPr algn="ctr"/>
+            <a:endParaRPr lang="en-US"/>
+          </a:p>
+        </p:txBody>
+      </p:sp>
+      <p:sp>
+        <p:nvSpPr>
+          <p:cNvPr id="18" name="Rounded Rectangle 17">
+            <a:extLst>
+              <a:ext uri="{FF2B5EF4-FFF2-40B4-BE49-F238E27FC236}">
+                <a16:creationId xmlns:a16="http://schemas.microsoft.com/office/drawing/2014/main" id="{DEC6C4AD-C373-3381-98C7-FF51E236F46A}"/>
+              </a:ext>
+            </a:extLst>
+          </p:cNvPr>
+          <p:cNvSpPr/>
+          <p:nvPr/>
+        </p:nvSpPr>
+        <p:spPr>
+          <a:xfrm>
+            <a:off x="10524641" y="5388713"/>
+            <a:ext cx="886518" cy="945880"/>
+          </a:xfrm>
+          <a:prstGeom prst="roundRect">
+            <a:avLst/>
+          </a:prstGeom>
+          <a:solidFill>
+            <a:schemeClr val="accent1">
+              <a:lumMod val="20000"/>
+              <a:lumOff val="80000"/>
+            </a:schemeClr>
+          </a:solidFill>
+        </p:spPr>
+        <p:style>
+          <a:lnRef idx="2">
+            <a:schemeClr val="accent1">
+              <a:shade val="15000"/>
+            </a:schemeClr>
+          </a:lnRef>
+          <a:fillRef idx="1">
+            <a:schemeClr val="accent1"/>
+          </a:fillRef>
+          <a:effectRef idx="0">
+            <a:schemeClr val="accent1"/>
+          </a:effectRef>
+          <a:fontRef idx="minor">
+            <a:schemeClr val="lt1"/>
+          </a:fontRef>
+        </p:style>
+        <p:txBody>
+          <a:bodyPr rtlCol="0" anchor="ctr"/>
+          <a:lstStyle/>
+          <a:p>
+            <a:pPr algn="ctr"/>
+            <a:endParaRPr lang="en-US"/>
+          </a:p>
+        </p:txBody>
+      </p:sp>
+      <p:sp>
+        <p:nvSpPr>
+          <p:cNvPr id="19" name="Rounded Rectangle 18">
+            <a:extLst>
+              <a:ext uri="{FF2B5EF4-FFF2-40B4-BE49-F238E27FC236}">
+                <a16:creationId xmlns:a16="http://schemas.microsoft.com/office/drawing/2014/main" id="{F9803070-134F-0254-7843-523DE987BF68}"/>
+              </a:ext>
+            </a:extLst>
+          </p:cNvPr>
+          <p:cNvSpPr/>
+          <p:nvPr/>
+        </p:nvSpPr>
+        <p:spPr>
+          <a:xfrm>
+            <a:off x="780841" y="5393853"/>
+            <a:ext cx="886518" cy="945880"/>
+          </a:xfrm>
+          <a:prstGeom prst="roundRect">
+            <a:avLst/>
+          </a:prstGeom>
+          <a:solidFill>
+            <a:schemeClr val="accent1">
+              <a:lumMod val="20000"/>
+              <a:lumOff val="80000"/>
+            </a:schemeClr>
+          </a:solidFill>
+        </p:spPr>
+        <p:style>
+          <a:lnRef idx="2">
+            <a:schemeClr val="accent1">
+              <a:shade val="15000"/>
+            </a:schemeClr>
+          </a:lnRef>
+          <a:fillRef idx="1">
+            <a:schemeClr val="accent1"/>
+          </a:fillRef>
+          <a:effectRef idx="0">
+            <a:schemeClr val="accent1"/>
+          </a:effectRef>
+          <a:fontRef idx="minor">
+            <a:schemeClr val="lt1"/>
+          </a:fontRef>
+        </p:style>
+        <p:txBody>
+          <a:bodyPr rtlCol="0" anchor="ctr"/>
+          <a:lstStyle/>
+          <a:p>
+            <a:pPr algn="ctr"/>
+            <a:endParaRPr lang="en-US"/>
+          </a:p>
+        </p:txBody>
+      </p:sp>
+      <p:sp>
+        <p:nvSpPr>
+          <p:cNvPr id="20" name="Rounded Rectangle 19">
+            <a:extLst>
+              <a:ext uri="{FF2B5EF4-FFF2-40B4-BE49-F238E27FC236}">
+                <a16:creationId xmlns:a16="http://schemas.microsoft.com/office/drawing/2014/main" id="{7EE32516-F189-47A0-C449-F44A8F5B0169}"/>
+              </a:ext>
+            </a:extLst>
+          </p:cNvPr>
+          <p:cNvSpPr/>
+          <p:nvPr/>
+        </p:nvSpPr>
+        <p:spPr>
+          <a:xfrm>
+            <a:off x="2114898" y="5393853"/>
+            <a:ext cx="886518" cy="945880"/>
+          </a:xfrm>
+          <a:prstGeom prst="roundRect">
+            <a:avLst/>
+          </a:prstGeom>
+          <a:solidFill>
+            <a:schemeClr val="accent1">
+              <a:lumMod val="20000"/>
+              <a:lumOff val="80000"/>
+            </a:schemeClr>
+          </a:solidFill>
+        </p:spPr>
+        <p:style>
+          <a:lnRef idx="2">
+            <a:schemeClr val="accent1">
+              <a:shade val="15000"/>
+            </a:schemeClr>
+          </a:lnRef>
+          <a:fillRef idx="1">
+            <a:schemeClr val="accent1"/>
+          </a:fillRef>
+          <a:effectRef idx="0">
+            <a:schemeClr val="accent1"/>
+          </a:effectRef>
+          <a:fontRef idx="minor">
+            <a:schemeClr val="lt1"/>
+          </a:fontRef>
+        </p:style>
+        <p:txBody>
+          <a:bodyPr rtlCol="0" anchor="ctr"/>
+          <a:lstStyle/>
+          <a:p>
+            <a:pPr algn="ctr"/>
+            <a:endParaRPr lang="en-US"/>
+          </a:p>
+        </p:txBody>
+      </p:sp>
+      <p:sp>
+        <p:nvSpPr>
+          <p:cNvPr id="21" name="Rounded Rectangle 20">
+            <a:extLst>
+              <a:ext uri="{FF2B5EF4-FFF2-40B4-BE49-F238E27FC236}">
+                <a16:creationId xmlns:a16="http://schemas.microsoft.com/office/drawing/2014/main" id="{6E445BD2-ED49-AA64-2810-78AA6A1BAB19}"/>
+              </a:ext>
+            </a:extLst>
+          </p:cNvPr>
+          <p:cNvSpPr/>
+          <p:nvPr/>
+        </p:nvSpPr>
+        <p:spPr>
+          <a:xfrm>
+            <a:off x="3594370" y="5388713"/>
+            <a:ext cx="886518" cy="945880"/>
+          </a:xfrm>
+          <a:prstGeom prst="roundRect">
+            <a:avLst/>
+          </a:prstGeom>
+          <a:solidFill>
+            <a:schemeClr val="accent1">
+              <a:lumMod val="20000"/>
+              <a:lumOff val="80000"/>
+            </a:schemeClr>
+          </a:solidFill>
+        </p:spPr>
+        <p:style>
+          <a:lnRef idx="2">
+            <a:schemeClr val="accent1">
+              <a:shade val="15000"/>
+            </a:schemeClr>
+          </a:lnRef>
+          <a:fillRef idx="1">
+            <a:schemeClr val="accent1"/>
+          </a:fillRef>
+          <a:effectRef idx="0">
+            <a:schemeClr val="accent1"/>
+          </a:effectRef>
+          <a:fontRef idx="minor">
+            <a:schemeClr val="lt1"/>
+          </a:fontRef>
+        </p:style>
+        <p:txBody>
+          <a:bodyPr rtlCol="0" anchor="ctr"/>
+          <a:lstStyle/>
+          <a:p>
+            <a:pPr algn="ctr"/>
+            <a:endParaRPr lang="en-US"/>
+          </a:p>
+        </p:txBody>
+      </p:sp>
+      <p:sp>
+        <p:nvSpPr>
+          <p:cNvPr id="22" name="Rounded Rectangle 21">
+            <a:extLst>
+              <a:ext uri="{FF2B5EF4-FFF2-40B4-BE49-F238E27FC236}">
+                <a16:creationId xmlns:a16="http://schemas.microsoft.com/office/drawing/2014/main" id="{2F263691-B127-F211-E794-492BA66A49B4}"/>
+              </a:ext>
+            </a:extLst>
+          </p:cNvPr>
+          <p:cNvSpPr/>
+          <p:nvPr/>
+        </p:nvSpPr>
+        <p:spPr>
+          <a:xfrm>
+            <a:off x="4937439" y="5388713"/>
+            <a:ext cx="886518" cy="945880"/>
+          </a:xfrm>
+          <a:prstGeom prst="roundRect">
+            <a:avLst/>
+          </a:prstGeom>
+          <a:solidFill>
+            <a:schemeClr val="accent1">
+              <a:lumMod val="20000"/>
+              <a:lumOff val="80000"/>
+            </a:schemeClr>
+          </a:solidFill>
+        </p:spPr>
+        <p:style>
+          <a:lnRef idx="2">
+            <a:schemeClr val="accent1">
+              <a:shade val="15000"/>
+            </a:schemeClr>
+          </a:lnRef>
+          <a:fillRef idx="1">
+            <a:schemeClr val="accent1"/>
+          </a:fillRef>
+          <a:effectRef idx="0">
+            <a:schemeClr val="accent1"/>
+          </a:effectRef>
+          <a:fontRef idx="minor">
+            <a:schemeClr val="lt1"/>
+          </a:fontRef>
+        </p:style>
+        <p:txBody>
+          <a:bodyPr rtlCol="0" anchor="ctr"/>
+          <a:lstStyle/>
+          <a:p>
+            <a:pPr algn="ctr"/>
+            <a:endParaRPr lang="en-US"/>
+          </a:p>
+        </p:txBody>
+      </p:sp>
+      <p:sp>
+        <p:nvSpPr>
+          <p:cNvPr id="23" name="Rounded Rectangle 22">
+            <a:extLst>
+              <a:ext uri="{FF2B5EF4-FFF2-40B4-BE49-F238E27FC236}">
+                <a16:creationId xmlns:a16="http://schemas.microsoft.com/office/drawing/2014/main" id="{F7A16E9C-109B-8FC4-DB49-16204A73A85A}"/>
+              </a:ext>
+            </a:extLst>
+          </p:cNvPr>
+          <p:cNvSpPr/>
+          <p:nvPr/>
+        </p:nvSpPr>
+        <p:spPr>
+          <a:xfrm>
+            <a:off x="6448776" y="5388713"/>
+            <a:ext cx="886518" cy="945880"/>
+          </a:xfrm>
+          <a:prstGeom prst="roundRect">
+            <a:avLst/>
+          </a:prstGeom>
+          <a:solidFill>
+            <a:schemeClr val="accent1">
+              <a:lumMod val="20000"/>
+              <a:lumOff val="80000"/>
+            </a:schemeClr>
+          </a:solidFill>
+        </p:spPr>
+        <p:style>
+          <a:lnRef idx="2">
+            <a:schemeClr val="accent1">
+              <a:shade val="15000"/>
+            </a:schemeClr>
+          </a:lnRef>
+          <a:fillRef idx="1">
+            <a:schemeClr val="accent1"/>
+          </a:fillRef>
+          <a:effectRef idx="0">
+            <a:schemeClr val="accent1"/>
+          </a:effectRef>
+          <a:fontRef idx="minor">
+            <a:schemeClr val="lt1"/>
+          </a:fontRef>
+        </p:style>
+        <p:txBody>
+          <a:bodyPr rtlCol="0" anchor="ctr"/>
+          <a:lstStyle/>
+          <a:p>
+            <a:pPr algn="ctr"/>
+            <a:endParaRPr lang="en-US"/>
+          </a:p>
+        </p:txBody>
+      </p:sp>
+      <p:sp>
+        <p:nvSpPr>
+          <p:cNvPr id="24" name="Rounded Rectangle 23">
+            <a:extLst>
+              <a:ext uri="{FF2B5EF4-FFF2-40B4-BE49-F238E27FC236}">
+                <a16:creationId xmlns:a16="http://schemas.microsoft.com/office/drawing/2014/main" id="{C5E56408-8357-A610-80CC-9031B52086DF}"/>
+              </a:ext>
+            </a:extLst>
+          </p:cNvPr>
+          <p:cNvSpPr/>
+          <p:nvPr/>
+        </p:nvSpPr>
+        <p:spPr>
+          <a:xfrm>
+            <a:off x="7789892" y="5388713"/>
+            <a:ext cx="886518" cy="945880"/>
+          </a:xfrm>
+          <a:prstGeom prst="roundRect">
+            <a:avLst/>
+          </a:prstGeom>
+          <a:solidFill>
+            <a:schemeClr val="accent1">
+              <a:lumMod val="20000"/>
+              <a:lumOff val="80000"/>
+            </a:schemeClr>
+          </a:solidFill>
+        </p:spPr>
+        <p:style>
+          <a:lnRef idx="2">
+            <a:schemeClr val="accent1">
+              <a:shade val="15000"/>
+            </a:schemeClr>
+          </a:lnRef>
+          <a:fillRef idx="1">
+            <a:schemeClr val="accent1"/>
+          </a:fillRef>
+          <a:effectRef idx="0">
+            <a:schemeClr val="accent1"/>
+          </a:effectRef>
+          <a:fontRef idx="minor">
+            <a:schemeClr val="lt1"/>
+          </a:fontRef>
+        </p:style>
+        <p:txBody>
+          <a:bodyPr rtlCol="0" anchor="ctr"/>
+          <a:lstStyle/>
+          <a:p>
+            <a:pPr algn="ctr"/>
+            <a:endParaRPr lang="en-US"/>
+          </a:p>
+        </p:txBody>
+      </p:sp>
+      <p:grpSp>
+        <p:nvGrpSpPr>
+          <p:cNvPr id="85" name="Group 84">
+            <a:extLst>
+              <a:ext uri="{FF2B5EF4-FFF2-40B4-BE49-F238E27FC236}">
+                <a16:creationId xmlns:a16="http://schemas.microsoft.com/office/drawing/2014/main" id="{20CABE8F-6963-76A4-7486-D11A6968B95F}"/>
+              </a:ext>
+            </a:extLst>
+          </p:cNvPr>
+          <p:cNvGrpSpPr/>
+          <p:nvPr/>
+        </p:nvGrpSpPr>
+        <p:grpSpPr>
+          <a:xfrm>
+            <a:off x="4807647" y="746497"/>
+            <a:ext cx="2539558" cy="1200330"/>
+            <a:chOff x="4795736" y="378341"/>
+            <a:chExt cx="2539558" cy="1200330"/>
+          </a:xfrm>
+        </p:grpSpPr>
+        <p:sp>
+          <p:nvSpPr>
+            <p:cNvPr id="3" name="Rounded Rectangle 2">
+              <a:extLst>
+                <a:ext uri="{FF2B5EF4-FFF2-40B4-BE49-F238E27FC236}">
+                  <a16:creationId xmlns:a16="http://schemas.microsoft.com/office/drawing/2014/main" id="{5970B885-85A7-84BC-78BB-C1F1CCC505C7}"/>
+                </a:ext>
+              </a:extLst>
+            </p:cNvPr>
+            <p:cNvSpPr/>
+            <p:nvPr/>
+          </p:nvSpPr>
+          <p:spPr>
+            <a:xfrm>
+              <a:off x="4795736" y="378341"/>
+              <a:ext cx="2539558" cy="1129445"/>
+            </a:xfrm>
+            <a:prstGeom prst="roundRect">
+              <a:avLst/>
+            </a:prstGeom>
+            <a:solidFill>
+              <a:schemeClr val="accent1">
+                <a:lumMod val="20000"/>
+                <a:lumOff val="80000"/>
+              </a:schemeClr>
+            </a:solidFill>
+          </p:spPr>
+          <p:style>
+            <a:lnRef idx="2">
+              <a:schemeClr val="accent1">
+                <a:shade val="15000"/>
+              </a:schemeClr>
+            </a:lnRef>
+            <a:fillRef idx="1">
+              <a:schemeClr val="accent1"/>
+            </a:fillRef>
+            <a:effectRef idx="0">
+              <a:schemeClr val="accent1"/>
+            </a:effectRef>
+            <a:fontRef idx="minor">
+              <a:schemeClr val="lt1"/>
+            </a:fontRef>
+          </p:style>
+          <p:txBody>
+            <a:bodyPr rtlCol="0" anchor="ctr"/>
+            <a:lstStyle/>
+            <a:p>
+              <a:pPr algn="ctr"/>
+              <a:endParaRPr lang="en-US"/>
+            </a:p>
+          </p:txBody>
+        </p:sp>
+        <p:sp>
+          <p:nvSpPr>
+            <p:cNvPr id="26" name="TextBox 25">
+              <a:extLst>
+                <a:ext uri="{FF2B5EF4-FFF2-40B4-BE49-F238E27FC236}">
+                  <a16:creationId xmlns:a16="http://schemas.microsoft.com/office/drawing/2014/main" id="{FF3615AC-A2FC-59E4-DFB6-88E50750ACFC}"/>
+                </a:ext>
+              </a:extLst>
+            </p:cNvPr>
+            <p:cNvSpPr txBox="1"/>
+            <p:nvPr/>
+          </p:nvSpPr>
+          <p:spPr>
+            <a:xfrm>
+              <a:off x="5380698" y="378342"/>
+              <a:ext cx="1527242" cy="1200329"/>
+            </a:xfrm>
+            <a:prstGeom prst="rect">
+              <a:avLst/>
+            </a:prstGeom>
+            <a:noFill/>
+          </p:spPr>
+          <p:txBody>
+            <a:bodyPr wrap="square" rtlCol="0">
+              <a:spAutoFit/>
+            </a:bodyPr>
+            <a:lstStyle/>
+            <a:p>
+              <a:r>
+                <a:rPr lang="en-US" dirty="0"/>
+                <a:t>How close friends feel about using marijuana?</a:t>
+              </a:r>
+            </a:p>
+          </p:txBody>
+        </p:sp>
+      </p:grpSp>
+      <p:grpSp>
+        <p:nvGrpSpPr>
+          <p:cNvPr id="84" name="Group 83">
+            <a:extLst>
+              <a:ext uri="{FF2B5EF4-FFF2-40B4-BE49-F238E27FC236}">
+                <a16:creationId xmlns:a16="http://schemas.microsoft.com/office/drawing/2014/main" id="{4A99FB49-1EA8-C59F-1DF3-2CC83DA212C8}"/>
+              </a:ext>
+            </a:extLst>
+          </p:cNvPr>
+          <p:cNvGrpSpPr/>
+          <p:nvPr/>
+        </p:nvGrpSpPr>
+        <p:grpSpPr>
+          <a:xfrm>
+            <a:off x="2103637" y="2023425"/>
+            <a:ext cx="2344003" cy="1129445"/>
+            <a:chOff x="2136885" y="1674807"/>
+            <a:chExt cx="2344003" cy="1129445"/>
+          </a:xfrm>
+        </p:grpSpPr>
+        <p:sp>
+          <p:nvSpPr>
+            <p:cNvPr id="7" name="Rounded Rectangle 6">
+              <a:extLst>
+                <a:ext uri="{FF2B5EF4-FFF2-40B4-BE49-F238E27FC236}">
+                  <a16:creationId xmlns:a16="http://schemas.microsoft.com/office/drawing/2014/main" id="{7D028213-9186-7BFE-8AB4-9026D9A56BDA}"/>
+                </a:ext>
+              </a:extLst>
+            </p:cNvPr>
+            <p:cNvSpPr/>
+            <p:nvPr/>
+          </p:nvSpPr>
+          <p:spPr>
+            <a:xfrm>
+              <a:off x="2136885" y="1674807"/>
+              <a:ext cx="2344003" cy="1129445"/>
+            </a:xfrm>
+            <a:prstGeom prst="roundRect">
+              <a:avLst/>
+            </a:prstGeom>
+            <a:solidFill>
+              <a:schemeClr val="accent1">
+                <a:lumMod val="20000"/>
+                <a:lumOff val="80000"/>
+              </a:schemeClr>
+            </a:solidFill>
+          </p:spPr>
+          <p:style>
+            <a:lnRef idx="2">
+              <a:schemeClr val="accent1">
+                <a:shade val="15000"/>
+              </a:schemeClr>
+            </a:lnRef>
+            <a:fillRef idx="1">
+              <a:schemeClr val="accent1"/>
+            </a:fillRef>
+            <a:effectRef idx="0">
+              <a:schemeClr val="accent1"/>
+            </a:effectRef>
+            <a:fontRef idx="minor">
+              <a:schemeClr val="lt1"/>
+            </a:fontRef>
+          </p:style>
+          <p:txBody>
+            <a:bodyPr rtlCol="0" anchor="ctr"/>
+            <a:lstStyle/>
+            <a:p>
+              <a:pPr algn="ctr"/>
+              <a:endParaRPr lang="en-US"/>
+            </a:p>
+          </p:txBody>
+        </p:sp>
+        <p:sp>
+          <p:nvSpPr>
+            <p:cNvPr id="27" name="TextBox 26">
+              <a:extLst>
+                <a:ext uri="{FF2B5EF4-FFF2-40B4-BE49-F238E27FC236}">
+                  <a16:creationId xmlns:a16="http://schemas.microsoft.com/office/drawing/2014/main" id="{8C23600C-C947-5E88-DCC7-D955C1B8B741}"/>
+                </a:ext>
+              </a:extLst>
+            </p:cNvPr>
+            <p:cNvSpPr txBox="1"/>
+            <p:nvPr/>
+          </p:nvSpPr>
+          <p:spPr>
+            <a:xfrm>
+              <a:off x="2821020" y="1916348"/>
+              <a:ext cx="1546698" cy="646331"/>
+            </a:xfrm>
+            <a:prstGeom prst="rect">
+              <a:avLst/>
+            </a:prstGeom>
+            <a:noFill/>
+          </p:spPr>
+          <p:txBody>
+            <a:bodyPr wrap="square" rtlCol="0">
+              <a:spAutoFit/>
+            </a:bodyPr>
+            <a:lstStyle/>
+            <a:p>
+              <a:r>
+                <a:rPr lang="en-US" dirty="0"/>
+                <a:t>Is mother present?</a:t>
+              </a:r>
+            </a:p>
+          </p:txBody>
+        </p:sp>
+      </p:grpSp>
+      <p:grpSp>
+        <p:nvGrpSpPr>
+          <p:cNvPr id="86" name="Group 85">
+            <a:extLst>
+              <a:ext uri="{FF2B5EF4-FFF2-40B4-BE49-F238E27FC236}">
+                <a16:creationId xmlns:a16="http://schemas.microsoft.com/office/drawing/2014/main" id="{3C3B27BA-FDA0-159E-4811-0F2523F04F5B}"/>
+              </a:ext>
+            </a:extLst>
+          </p:cNvPr>
+          <p:cNvGrpSpPr/>
+          <p:nvPr/>
+        </p:nvGrpSpPr>
+        <p:grpSpPr>
+          <a:xfrm>
+            <a:off x="7811176" y="1952541"/>
+            <a:ext cx="2344003" cy="1200329"/>
+            <a:chOff x="7789892" y="1603923"/>
+            <a:chExt cx="2344003" cy="1200329"/>
+          </a:xfrm>
+        </p:grpSpPr>
+        <p:sp>
+          <p:nvSpPr>
+            <p:cNvPr id="6" name="Rounded Rectangle 5">
+              <a:extLst>
+                <a:ext uri="{FF2B5EF4-FFF2-40B4-BE49-F238E27FC236}">
+                  <a16:creationId xmlns:a16="http://schemas.microsoft.com/office/drawing/2014/main" id="{45A119F1-3195-5E25-9ED4-1CE37E3734D8}"/>
+                </a:ext>
+              </a:extLst>
+            </p:cNvPr>
+            <p:cNvSpPr/>
+            <p:nvPr/>
+          </p:nvSpPr>
+          <p:spPr>
+            <a:xfrm>
+              <a:off x="7789892" y="1603923"/>
+              <a:ext cx="2344003" cy="1200329"/>
+            </a:xfrm>
+            <a:prstGeom prst="roundRect">
+              <a:avLst/>
+            </a:prstGeom>
+            <a:solidFill>
+              <a:schemeClr val="accent1">
+                <a:lumMod val="20000"/>
+                <a:lumOff val="80000"/>
+              </a:schemeClr>
+            </a:solidFill>
+          </p:spPr>
+          <p:style>
+            <a:lnRef idx="2">
+              <a:schemeClr val="accent1">
+                <a:shade val="15000"/>
+              </a:schemeClr>
+            </a:lnRef>
+            <a:fillRef idx="1">
+              <a:schemeClr val="accent1"/>
+            </a:fillRef>
+            <a:effectRef idx="0">
+              <a:schemeClr val="accent1"/>
+            </a:effectRef>
+            <a:fontRef idx="minor">
+              <a:schemeClr val="lt1"/>
+            </a:fontRef>
+          </p:style>
+          <p:txBody>
+            <a:bodyPr rtlCol="0" anchor="ctr"/>
+            <a:lstStyle/>
+            <a:p>
+              <a:pPr algn="ctr"/>
+              <a:endParaRPr lang="en-US"/>
+            </a:p>
+          </p:txBody>
+        </p:sp>
+        <p:sp>
+          <p:nvSpPr>
+            <p:cNvPr id="28" name="TextBox 27">
+              <a:extLst>
+                <a:ext uri="{FF2B5EF4-FFF2-40B4-BE49-F238E27FC236}">
+                  <a16:creationId xmlns:a16="http://schemas.microsoft.com/office/drawing/2014/main" id="{6A9E39F2-A25E-AB01-12D1-B6CB93CB6EC6}"/>
+                </a:ext>
+              </a:extLst>
+            </p:cNvPr>
+            <p:cNvSpPr txBox="1"/>
+            <p:nvPr/>
+          </p:nvSpPr>
+          <p:spPr>
+            <a:xfrm>
+              <a:off x="8423191" y="1603923"/>
+              <a:ext cx="1527243" cy="1200329"/>
+            </a:xfrm>
+            <a:prstGeom prst="rect">
+              <a:avLst/>
+            </a:prstGeom>
+            <a:noFill/>
+          </p:spPr>
+          <p:txBody>
+            <a:bodyPr wrap="square" rtlCol="0">
+              <a:spAutoFit/>
+            </a:bodyPr>
+            <a:lstStyle/>
+            <a:p>
+              <a:r>
+                <a:rPr lang="en-US" dirty="0"/>
+                <a:t>How many days of school skipped?</a:t>
+              </a:r>
+            </a:p>
+          </p:txBody>
+        </p:sp>
+      </p:grpSp>
+      <p:sp>
+        <p:nvSpPr>
+          <p:cNvPr id="29" name="TextBox 28">
+            <a:extLst>
+              <a:ext uri="{FF2B5EF4-FFF2-40B4-BE49-F238E27FC236}">
+                <a16:creationId xmlns:a16="http://schemas.microsoft.com/office/drawing/2014/main" id="{57B6205F-7A7B-138D-0FF5-C55B3F4E22D7}"/>
+              </a:ext>
+            </a:extLst>
+          </p:cNvPr>
+          <p:cNvSpPr txBox="1"/>
+          <p:nvPr/>
+        </p:nvSpPr>
+        <p:spPr>
+          <a:xfrm>
+            <a:off x="4173817" y="3514391"/>
+            <a:ext cx="1527243" cy="1200329"/>
           </a:xfrm>
           <a:prstGeom prst="rect">
             <a:avLst/>
           </a:prstGeom>
+          <a:noFill/>
         </p:spPr>
-      </p:pic>
+        <p:txBody>
+          <a:bodyPr wrap="square" rtlCol="0">
+            <a:spAutoFit/>
+          </a:bodyPr>
+          <a:lstStyle/>
+          <a:p>
+            <a:r>
+              <a:rPr lang="en-US" dirty="0"/>
+              <a:t>How many days of school skipped?</a:t>
+            </a:r>
+          </a:p>
+        </p:txBody>
+      </p:sp>
+      <p:sp>
+        <p:nvSpPr>
+          <p:cNvPr id="30" name="TextBox 29">
+            <a:extLst>
+              <a:ext uri="{FF2B5EF4-FFF2-40B4-BE49-F238E27FC236}">
+                <a16:creationId xmlns:a16="http://schemas.microsoft.com/office/drawing/2014/main" id="{1C2E9AC7-CCAA-F200-043A-82A0ED7E41FB}"/>
+              </a:ext>
+            </a:extLst>
+          </p:cNvPr>
+          <p:cNvSpPr txBox="1"/>
+          <p:nvPr/>
+        </p:nvSpPr>
+        <p:spPr>
+          <a:xfrm>
+            <a:off x="1580950" y="3983077"/>
+            <a:ext cx="1029154" cy="369332"/>
+          </a:xfrm>
+          <a:prstGeom prst="rect">
+            <a:avLst/>
+          </a:prstGeom>
+          <a:noFill/>
+        </p:spPr>
+        <p:txBody>
+          <a:bodyPr wrap="square" rtlCol="0">
+            <a:spAutoFit/>
+          </a:bodyPr>
+          <a:lstStyle/>
+          <a:p>
+            <a:r>
+              <a:rPr lang="en-US" dirty="0"/>
+              <a:t>Sex?</a:t>
+            </a:r>
+          </a:p>
+        </p:txBody>
+      </p:sp>
+      <p:sp>
+        <p:nvSpPr>
+          <p:cNvPr id="31" name="TextBox 30">
+            <a:extLst>
+              <a:ext uri="{FF2B5EF4-FFF2-40B4-BE49-F238E27FC236}">
+                <a16:creationId xmlns:a16="http://schemas.microsoft.com/office/drawing/2014/main" id="{954ADEE7-9885-27F8-5B99-6D545520508B}"/>
+              </a:ext>
+            </a:extLst>
+          </p:cNvPr>
+          <p:cNvSpPr txBox="1"/>
+          <p:nvPr/>
+        </p:nvSpPr>
+        <p:spPr>
+          <a:xfrm>
+            <a:off x="6968691" y="3721711"/>
+            <a:ext cx="1425114" cy="923330"/>
+          </a:xfrm>
+          <a:prstGeom prst="rect">
+            <a:avLst/>
+          </a:prstGeom>
+          <a:noFill/>
+        </p:spPr>
+        <p:txBody>
+          <a:bodyPr wrap="square" rtlCol="0">
+            <a:spAutoFit/>
+          </a:bodyPr>
+          <a:lstStyle/>
+          <a:p>
+            <a:r>
+              <a:rPr lang="en-US" dirty="0"/>
+              <a:t>Highest grade completed?</a:t>
+            </a:r>
+          </a:p>
+        </p:txBody>
+      </p:sp>
+      <p:sp>
+        <p:nvSpPr>
+          <p:cNvPr id="32" name="TextBox 31">
+            <a:extLst>
+              <a:ext uri="{FF2B5EF4-FFF2-40B4-BE49-F238E27FC236}">
+                <a16:creationId xmlns:a16="http://schemas.microsoft.com/office/drawing/2014/main" id="{1C7B9D28-5AAB-6447-24F3-AFB00E9DAF7A}"/>
+              </a:ext>
+            </a:extLst>
+          </p:cNvPr>
+          <p:cNvSpPr txBox="1"/>
+          <p:nvPr/>
+        </p:nvSpPr>
+        <p:spPr>
+          <a:xfrm>
+            <a:off x="9558914" y="3983077"/>
+            <a:ext cx="1483432" cy="369332"/>
+          </a:xfrm>
+          <a:prstGeom prst="rect">
+            <a:avLst/>
+          </a:prstGeom>
+          <a:noFill/>
+        </p:spPr>
+        <p:txBody>
+          <a:bodyPr wrap="square" rtlCol="0">
+            <a:spAutoFit/>
+          </a:bodyPr>
+          <a:lstStyle/>
+          <a:p>
+            <a:r>
+              <a:rPr lang="en-US" dirty="0"/>
+              <a:t>Avg grade?</a:t>
+            </a:r>
+          </a:p>
+        </p:txBody>
+      </p:sp>
       <p:cxnSp>
         <p:nvCxnSpPr>
-          <p:cNvPr id="32" name="Straight Connector 31">
+          <p:cNvPr id="34" name="Elbow Connector 33">
             <a:extLst>
               <a:ext uri="{FF2B5EF4-FFF2-40B4-BE49-F238E27FC236}">
-                <a16:creationId xmlns:a16="http://schemas.microsoft.com/office/drawing/2014/main" id="{9AE2764D-E1C7-4C0E-A5A4-12411550ABAD}"/>
-              </a:ext>
-              <a:ext uri="{C183D7F6-B498-43B3-948B-1728B52AA6E4}">
-                <adec:decorative xmlns:adec="http://schemas.microsoft.com/office/drawing/2017/decorative" val="1"/>
+                <a16:creationId xmlns:a16="http://schemas.microsoft.com/office/drawing/2014/main" id="{BF808CF2-D6D3-679C-537E-14EAAB5440EE}"/>
               </a:ext>
             </a:extLst>
           </p:cNvPr>
           <p:cNvCxnSpPr>
-            <a:cxnSpLocks noGrp="1" noRot="1" noChangeAspect="1" noMove="1" noResize="1" noEditPoints="1" noAdjustHandles="1" noChangeArrowheads="1" noChangeShapeType="1"/>
+            <a:cxnSpLocks/>
+            <a:stCxn id="3" idx="1"/>
+            <a:endCxn id="7" idx="0"/>
           </p:cNvCxnSpPr>
-          <p:nvPr>
-            <p:extLst>
-              <p:ext uri="{386F3935-93C4-4BCD-93E2-E3B085C9AB24}">
-                <p16:designElem xmlns:p16="http://schemas.microsoft.com/office/powerpoint/2015/main" val="1"/>
-              </p:ext>
-            </p:extLst>
-          </p:nvPr>
+          <p:nvPr/>
         </p:nvCxnSpPr>
         <p:spPr>
-          <a:xfrm flipV="1">
-            <a:off x="11537289" y="640311"/>
-            <a:ext cx="0" cy="5579514"/>
+          <a:xfrm rot="10800000" flipV="1">
+            <a:off x="3275639" y="1311219"/>
+            <a:ext cx="1532008" cy="712205"/>
           </a:xfrm>
-          <a:prstGeom prst="line">
+          <a:prstGeom prst="bentConnector2">
             <a:avLst/>
           </a:prstGeom>
-          <a:ln w="76200"/>
+          <a:ln>
+            <a:tailEnd type="triangle"/>
+          </a:ln>
+        </p:spPr>
+        <p:style>
+          <a:lnRef idx="1">
+            <a:schemeClr val="accent1"/>
+          </a:lnRef>
+          <a:fillRef idx="0">
+            <a:schemeClr val="accent1"/>
+          </a:fillRef>
+          <a:effectRef idx="0">
+            <a:schemeClr val="accent1"/>
+          </a:effectRef>
+          <a:fontRef idx="minor">
+            <a:schemeClr val="tx1"/>
+          </a:fontRef>
+        </p:style>
+      </p:cxnSp>
+      <p:cxnSp>
+        <p:nvCxnSpPr>
+          <p:cNvPr id="36" name="Elbow Connector 35">
+            <a:extLst>
+              <a:ext uri="{FF2B5EF4-FFF2-40B4-BE49-F238E27FC236}">
+                <a16:creationId xmlns:a16="http://schemas.microsoft.com/office/drawing/2014/main" id="{95411222-EAE3-9350-6762-0E13FED2B072}"/>
+              </a:ext>
+            </a:extLst>
+          </p:cNvPr>
+          <p:cNvCxnSpPr>
+            <a:cxnSpLocks/>
+            <a:stCxn id="6" idx="1"/>
+            <a:endCxn id="9" idx="0"/>
+          </p:cNvCxnSpPr>
+          <p:nvPr/>
+        </p:nvCxnSpPr>
+        <p:spPr>
+          <a:xfrm rot="10800000" flipV="1">
+            <a:off x="7562594" y="2552705"/>
+            <a:ext cx="248583" cy="1126005"/>
+          </a:xfrm>
+          <a:prstGeom prst="bentConnector2">
+            <a:avLst/>
+          </a:prstGeom>
+          <a:ln>
+            <a:tailEnd type="triangle"/>
+          </a:ln>
+        </p:spPr>
+        <p:style>
+          <a:lnRef idx="1">
+            <a:schemeClr val="accent1"/>
+          </a:lnRef>
+          <a:fillRef idx="0">
+            <a:schemeClr val="accent1"/>
+          </a:fillRef>
+          <a:effectRef idx="0">
+            <a:schemeClr val="accent1"/>
+          </a:effectRef>
+          <a:fontRef idx="minor">
+            <a:schemeClr val="tx1"/>
+          </a:fontRef>
+        </p:style>
+      </p:cxnSp>
+      <p:cxnSp>
+        <p:nvCxnSpPr>
+          <p:cNvPr id="37" name="Elbow Connector 36">
+            <a:extLst>
+              <a:ext uri="{FF2B5EF4-FFF2-40B4-BE49-F238E27FC236}">
+                <a16:creationId xmlns:a16="http://schemas.microsoft.com/office/drawing/2014/main" id="{E5E2DB5B-9029-B450-965F-A9B4D24620DC}"/>
+              </a:ext>
+            </a:extLst>
+          </p:cNvPr>
+          <p:cNvCxnSpPr>
+            <a:cxnSpLocks/>
+            <a:stCxn id="7" idx="3"/>
+            <a:endCxn id="29" idx="0"/>
+          </p:cNvCxnSpPr>
+          <p:nvPr/>
+        </p:nvCxnSpPr>
+        <p:spPr>
+          <a:xfrm>
+            <a:off x="4447640" y="2588148"/>
+            <a:ext cx="489799" cy="926243"/>
+          </a:xfrm>
+          <a:prstGeom prst="bentConnector2">
+            <a:avLst/>
+          </a:prstGeom>
+          <a:ln>
+            <a:tailEnd type="triangle"/>
+          </a:ln>
+        </p:spPr>
+        <p:style>
+          <a:lnRef idx="1">
+            <a:schemeClr val="accent1"/>
+          </a:lnRef>
+          <a:fillRef idx="0">
+            <a:schemeClr val="accent1"/>
+          </a:fillRef>
+          <a:effectRef idx="0">
+            <a:schemeClr val="accent1"/>
+          </a:effectRef>
+          <a:fontRef idx="minor">
+            <a:schemeClr val="tx1"/>
+          </a:fontRef>
+        </p:style>
+      </p:cxnSp>
+      <p:cxnSp>
+        <p:nvCxnSpPr>
+          <p:cNvPr id="38" name="Elbow Connector 37">
+            <a:extLst>
+              <a:ext uri="{FF2B5EF4-FFF2-40B4-BE49-F238E27FC236}">
+                <a16:creationId xmlns:a16="http://schemas.microsoft.com/office/drawing/2014/main" id="{7EDAEC1F-94E9-DAD1-241D-2D8F5425A451}"/>
+              </a:ext>
+            </a:extLst>
+          </p:cNvPr>
+          <p:cNvCxnSpPr>
+            <a:cxnSpLocks/>
+            <a:stCxn id="7" idx="1"/>
+            <a:endCxn id="11" idx="0"/>
+          </p:cNvCxnSpPr>
+          <p:nvPr/>
+        </p:nvCxnSpPr>
+        <p:spPr>
+          <a:xfrm rot="10800000" flipV="1">
+            <a:off x="1891371" y="2588147"/>
+            <a:ext cx="212267" cy="1090563"/>
+          </a:xfrm>
+          <a:prstGeom prst="bentConnector2">
+            <a:avLst/>
+          </a:prstGeom>
+          <a:ln>
+            <a:tailEnd type="triangle"/>
+          </a:ln>
+        </p:spPr>
+        <p:style>
+          <a:lnRef idx="1">
+            <a:schemeClr val="accent1"/>
+          </a:lnRef>
+          <a:fillRef idx="0">
+            <a:schemeClr val="accent1"/>
+          </a:fillRef>
+          <a:effectRef idx="0">
+            <a:schemeClr val="accent1"/>
+          </a:effectRef>
+          <a:fontRef idx="minor">
+            <a:schemeClr val="tx1"/>
+          </a:fontRef>
+        </p:style>
+      </p:cxnSp>
+      <p:cxnSp>
+        <p:nvCxnSpPr>
+          <p:cNvPr id="39" name="Elbow Connector 38">
+            <a:extLst>
+              <a:ext uri="{FF2B5EF4-FFF2-40B4-BE49-F238E27FC236}">
+                <a16:creationId xmlns:a16="http://schemas.microsoft.com/office/drawing/2014/main" id="{9DDD2B08-5500-FDDD-0917-1048DBE31BAE}"/>
+              </a:ext>
+            </a:extLst>
+          </p:cNvPr>
+          <p:cNvCxnSpPr>
+            <a:cxnSpLocks/>
+            <a:stCxn id="3" idx="3"/>
+            <a:endCxn id="28" idx="0"/>
+          </p:cNvCxnSpPr>
+          <p:nvPr/>
+        </p:nvCxnSpPr>
+        <p:spPr>
+          <a:xfrm>
+            <a:off x="7347205" y="1311220"/>
+            <a:ext cx="1860892" cy="641321"/>
+          </a:xfrm>
+          <a:prstGeom prst="bentConnector2">
+            <a:avLst/>
+          </a:prstGeom>
+          <a:ln>
+            <a:tailEnd type="triangle"/>
+          </a:ln>
+        </p:spPr>
+        <p:style>
+          <a:lnRef idx="1">
+            <a:schemeClr val="accent1"/>
+          </a:lnRef>
+          <a:fillRef idx="0">
+            <a:schemeClr val="accent1"/>
+          </a:fillRef>
+          <a:effectRef idx="0">
+            <a:schemeClr val="accent1"/>
+          </a:effectRef>
+          <a:fontRef idx="minor">
+            <a:schemeClr val="tx1"/>
+          </a:fontRef>
+        </p:style>
+      </p:cxnSp>
+      <p:cxnSp>
+        <p:nvCxnSpPr>
+          <p:cNvPr id="48" name="Elbow Connector 47">
+            <a:extLst>
+              <a:ext uri="{FF2B5EF4-FFF2-40B4-BE49-F238E27FC236}">
+                <a16:creationId xmlns:a16="http://schemas.microsoft.com/office/drawing/2014/main" id="{57DCFBFE-0092-D16D-F4C9-7F75B947F4E7}"/>
+              </a:ext>
+            </a:extLst>
+          </p:cNvPr>
+          <p:cNvCxnSpPr>
+            <a:cxnSpLocks/>
+            <a:stCxn id="6" idx="3"/>
+            <a:endCxn id="8" idx="0"/>
+          </p:cNvCxnSpPr>
+          <p:nvPr/>
+        </p:nvCxnSpPr>
+        <p:spPr>
+          <a:xfrm>
+            <a:off x="10155179" y="2552706"/>
+            <a:ext cx="145451" cy="1126005"/>
+          </a:xfrm>
+          <a:prstGeom prst="bentConnector2">
+            <a:avLst/>
+          </a:prstGeom>
+          <a:ln>
+            <a:tailEnd type="triangle"/>
+          </a:ln>
+        </p:spPr>
+        <p:style>
+          <a:lnRef idx="1">
+            <a:schemeClr val="accent1"/>
+          </a:lnRef>
+          <a:fillRef idx="0">
+            <a:schemeClr val="accent1"/>
+          </a:fillRef>
+          <a:effectRef idx="0">
+            <a:schemeClr val="accent1"/>
+          </a:effectRef>
+          <a:fontRef idx="minor">
+            <a:schemeClr val="tx1"/>
+          </a:fontRef>
+        </p:style>
+      </p:cxnSp>
+      <p:cxnSp>
+        <p:nvCxnSpPr>
+          <p:cNvPr id="54" name="Straight Arrow Connector 53">
+            <a:extLst>
+              <a:ext uri="{FF2B5EF4-FFF2-40B4-BE49-F238E27FC236}">
+                <a16:creationId xmlns:a16="http://schemas.microsoft.com/office/drawing/2014/main" id="{E5148D42-5DFB-1836-11C5-44FCC3261E1F}"/>
+              </a:ext>
+            </a:extLst>
+          </p:cNvPr>
+          <p:cNvCxnSpPr>
+            <a:endCxn id="19" idx="0"/>
+          </p:cNvCxnSpPr>
+          <p:nvPr/>
+        </p:nvCxnSpPr>
+        <p:spPr>
+          <a:xfrm>
+            <a:off x="1224100" y="4661205"/>
+            <a:ext cx="0" cy="732648"/>
+          </a:xfrm>
+          <a:prstGeom prst="straightConnector1">
+            <a:avLst/>
+          </a:prstGeom>
+          <a:ln>
+            <a:tailEnd type="triangle"/>
+          </a:ln>
+        </p:spPr>
+        <p:style>
+          <a:lnRef idx="1">
+            <a:schemeClr val="accent1"/>
+          </a:lnRef>
+          <a:fillRef idx="0">
+            <a:schemeClr val="accent1"/>
+          </a:fillRef>
+          <a:effectRef idx="0">
+            <a:schemeClr val="accent1"/>
+          </a:effectRef>
+          <a:fontRef idx="minor">
+            <a:schemeClr val="tx1"/>
+          </a:fontRef>
+        </p:style>
+      </p:cxnSp>
+      <p:cxnSp>
+        <p:nvCxnSpPr>
+          <p:cNvPr id="55" name="Straight Arrow Connector 54">
+            <a:extLst>
+              <a:ext uri="{FF2B5EF4-FFF2-40B4-BE49-F238E27FC236}">
+                <a16:creationId xmlns:a16="http://schemas.microsoft.com/office/drawing/2014/main" id="{E0BE7424-BC39-DE5F-2A38-9C8EEEAE7235}"/>
+              </a:ext>
+            </a:extLst>
+          </p:cNvPr>
+          <p:cNvCxnSpPr/>
+          <p:nvPr/>
+        </p:nvCxnSpPr>
+        <p:spPr>
+          <a:xfrm>
+            <a:off x="8218596" y="4661205"/>
+            <a:ext cx="0" cy="732648"/>
+          </a:xfrm>
+          <a:prstGeom prst="straightConnector1">
+            <a:avLst/>
+          </a:prstGeom>
+          <a:ln>
+            <a:tailEnd type="triangle"/>
+          </a:ln>
+        </p:spPr>
+        <p:style>
+          <a:lnRef idx="1">
+            <a:schemeClr val="accent1"/>
+          </a:lnRef>
+          <a:fillRef idx="0">
+            <a:schemeClr val="accent1"/>
+          </a:fillRef>
+          <a:effectRef idx="0">
+            <a:schemeClr val="accent1"/>
+          </a:effectRef>
+          <a:fontRef idx="minor">
+            <a:schemeClr val="tx1"/>
+          </a:fontRef>
+        </p:style>
+      </p:cxnSp>
+      <p:cxnSp>
+        <p:nvCxnSpPr>
+          <p:cNvPr id="56" name="Straight Arrow Connector 55">
+            <a:extLst>
+              <a:ext uri="{FF2B5EF4-FFF2-40B4-BE49-F238E27FC236}">
+                <a16:creationId xmlns:a16="http://schemas.microsoft.com/office/drawing/2014/main" id="{6C8E1040-E2AD-2124-B98A-A77DA62A52D7}"/>
+              </a:ext>
+            </a:extLst>
+          </p:cNvPr>
+          <p:cNvCxnSpPr/>
+          <p:nvPr/>
+        </p:nvCxnSpPr>
+        <p:spPr>
+          <a:xfrm>
+            <a:off x="6918969" y="4661205"/>
+            <a:ext cx="0" cy="732648"/>
+          </a:xfrm>
+          <a:prstGeom prst="straightConnector1">
+            <a:avLst/>
+          </a:prstGeom>
+          <a:ln>
+            <a:tailEnd type="triangle"/>
+          </a:ln>
+        </p:spPr>
+        <p:style>
+          <a:lnRef idx="1">
+            <a:schemeClr val="accent1"/>
+          </a:lnRef>
+          <a:fillRef idx="0">
+            <a:schemeClr val="accent1"/>
+          </a:fillRef>
+          <a:effectRef idx="0">
+            <a:schemeClr val="accent1"/>
+          </a:effectRef>
+          <a:fontRef idx="minor">
+            <a:schemeClr val="tx1"/>
+          </a:fontRef>
+        </p:style>
+      </p:cxnSp>
+      <p:cxnSp>
+        <p:nvCxnSpPr>
+          <p:cNvPr id="57" name="Straight Arrow Connector 56">
+            <a:extLst>
+              <a:ext uri="{FF2B5EF4-FFF2-40B4-BE49-F238E27FC236}">
+                <a16:creationId xmlns:a16="http://schemas.microsoft.com/office/drawing/2014/main" id="{702A3434-80FD-F26D-EBEE-3C8DB56C9391}"/>
+              </a:ext>
+            </a:extLst>
+          </p:cNvPr>
+          <p:cNvCxnSpPr/>
+          <p:nvPr/>
+        </p:nvCxnSpPr>
+        <p:spPr>
+          <a:xfrm>
+            <a:off x="5380698" y="4661205"/>
+            <a:ext cx="0" cy="732648"/>
+          </a:xfrm>
+          <a:prstGeom prst="straightConnector1">
+            <a:avLst/>
+          </a:prstGeom>
+          <a:ln>
+            <a:tailEnd type="triangle"/>
+          </a:ln>
+        </p:spPr>
+        <p:style>
+          <a:lnRef idx="1">
+            <a:schemeClr val="accent1"/>
+          </a:lnRef>
+          <a:fillRef idx="0">
+            <a:schemeClr val="accent1"/>
+          </a:fillRef>
+          <a:effectRef idx="0">
+            <a:schemeClr val="accent1"/>
+          </a:effectRef>
+          <a:fontRef idx="minor">
+            <a:schemeClr val="tx1"/>
+          </a:fontRef>
+        </p:style>
+      </p:cxnSp>
+      <p:cxnSp>
+        <p:nvCxnSpPr>
+          <p:cNvPr id="58" name="Straight Arrow Connector 57">
+            <a:extLst>
+              <a:ext uri="{FF2B5EF4-FFF2-40B4-BE49-F238E27FC236}">
+                <a16:creationId xmlns:a16="http://schemas.microsoft.com/office/drawing/2014/main" id="{26B5AC6F-2459-5902-5170-BB169651F6BE}"/>
+              </a:ext>
+            </a:extLst>
+          </p:cNvPr>
+          <p:cNvCxnSpPr/>
+          <p:nvPr/>
+        </p:nvCxnSpPr>
+        <p:spPr>
+          <a:xfrm>
+            <a:off x="4052312" y="4661205"/>
+            <a:ext cx="0" cy="732648"/>
+          </a:xfrm>
+          <a:prstGeom prst="straightConnector1">
+            <a:avLst/>
+          </a:prstGeom>
+          <a:ln>
+            <a:tailEnd type="triangle"/>
+          </a:ln>
+        </p:spPr>
+        <p:style>
+          <a:lnRef idx="1">
+            <a:schemeClr val="accent1"/>
+          </a:lnRef>
+          <a:fillRef idx="0">
+            <a:schemeClr val="accent1"/>
+          </a:fillRef>
+          <a:effectRef idx="0">
+            <a:schemeClr val="accent1"/>
+          </a:effectRef>
+          <a:fontRef idx="minor">
+            <a:schemeClr val="tx1"/>
+          </a:fontRef>
+        </p:style>
+      </p:cxnSp>
+      <p:cxnSp>
+        <p:nvCxnSpPr>
+          <p:cNvPr id="59" name="Straight Arrow Connector 58">
+            <a:extLst>
+              <a:ext uri="{FF2B5EF4-FFF2-40B4-BE49-F238E27FC236}">
+                <a16:creationId xmlns:a16="http://schemas.microsoft.com/office/drawing/2014/main" id="{113C8C19-1014-E96D-551B-1B04A5DBBE87}"/>
+              </a:ext>
+            </a:extLst>
+          </p:cNvPr>
+          <p:cNvCxnSpPr/>
+          <p:nvPr/>
+        </p:nvCxnSpPr>
+        <p:spPr>
+          <a:xfrm>
+            <a:off x="2558157" y="4661205"/>
+            <a:ext cx="0" cy="732648"/>
+          </a:xfrm>
+          <a:prstGeom prst="straightConnector1">
+            <a:avLst/>
+          </a:prstGeom>
+          <a:ln>
+            <a:tailEnd type="triangle"/>
+          </a:ln>
+        </p:spPr>
+        <p:style>
+          <a:lnRef idx="1">
+            <a:schemeClr val="accent1"/>
+          </a:lnRef>
+          <a:fillRef idx="0">
+            <a:schemeClr val="accent1"/>
+          </a:fillRef>
+          <a:effectRef idx="0">
+            <a:schemeClr val="accent1"/>
+          </a:effectRef>
+          <a:fontRef idx="minor">
+            <a:schemeClr val="tx1"/>
+          </a:fontRef>
+        </p:style>
+      </p:cxnSp>
+      <p:cxnSp>
+        <p:nvCxnSpPr>
+          <p:cNvPr id="60" name="Straight Arrow Connector 59">
+            <a:extLst>
+              <a:ext uri="{FF2B5EF4-FFF2-40B4-BE49-F238E27FC236}">
+                <a16:creationId xmlns:a16="http://schemas.microsoft.com/office/drawing/2014/main" id="{DBDA5FCA-CC41-ABC2-E0DD-3DCF715834E1}"/>
+              </a:ext>
+            </a:extLst>
+          </p:cNvPr>
+          <p:cNvCxnSpPr/>
+          <p:nvPr/>
+        </p:nvCxnSpPr>
+        <p:spPr>
+          <a:xfrm>
+            <a:off x="9625249" y="4661205"/>
+            <a:ext cx="0" cy="732648"/>
+          </a:xfrm>
+          <a:prstGeom prst="straightConnector1">
+            <a:avLst/>
+          </a:prstGeom>
+          <a:ln>
+            <a:tailEnd type="triangle"/>
+          </a:ln>
+        </p:spPr>
+        <p:style>
+          <a:lnRef idx="1">
+            <a:schemeClr val="accent1"/>
+          </a:lnRef>
+          <a:fillRef idx="0">
+            <a:schemeClr val="accent1"/>
+          </a:fillRef>
+          <a:effectRef idx="0">
+            <a:schemeClr val="accent1"/>
+          </a:effectRef>
+          <a:fontRef idx="minor">
+            <a:schemeClr val="tx1"/>
+          </a:fontRef>
+        </p:style>
+      </p:cxnSp>
+      <p:cxnSp>
+        <p:nvCxnSpPr>
+          <p:cNvPr id="61" name="Straight Arrow Connector 60">
+            <a:extLst>
+              <a:ext uri="{FF2B5EF4-FFF2-40B4-BE49-F238E27FC236}">
+                <a16:creationId xmlns:a16="http://schemas.microsoft.com/office/drawing/2014/main" id="{B1E07DAB-9432-7331-30D6-F6FD54E62B48}"/>
+              </a:ext>
+            </a:extLst>
+          </p:cNvPr>
+          <p:cNvCxnSpPr/>
+          <p:nvPr/>
+        </p:nvCxnSpPr>
+        <p:spPr>
+          <a:xfrm>
+            <a:off x="10967900" y="4645041"/>
+            <a:ext cx="0" cy="732648"/>
+          </a:xfrm>
+          <a:prstGeom prst="straightConnector1">
+            <a:avLst/>
+          </a:prstGeom>
+          <a:ln>
+            <a:tailEnd type="triangle"/>
+          </a:ln>
         </p:spPr>
         <p:style>
           <a:lnRef idx="1">
@@ -20359,54 +21714,813 @@
       </p:cxnSp>
       <p:sp>
         <p:nvSpPr>
-          <p:cNvPr id="4" name="Slide Number Placeholder 3">
+          <p:cNvPr id="62" name="TextBox 61">
             <a:extLst>
               <a:ext uri="{FF2B5EF4-FFF2-40B4-BE49-F238E27FC236}">
-                <a16:creationId xmlns:a16="http://schemas.microsoft.com/office/drawing/2014/main" id="{75D31F0B-C060-6DC4-C1CC-A382DBDDD62C}"/>
+                <a16:creationId xmlns:a16="http://schemas.microsoft.com/office/drawing/2014/main" id="{F614FF4D-F7EA-98BA-213F-A62B902F8E33}"/>
               </a:ext>
             </a:extLst>
           </p:cNvPr>
-          <p:cNvSpPr>
-            <a:spLocks noGrp="1"/>
-          </p:cNvSpPr>
-          <p:nvPr>
-            <p:ph type="sldNum" sz="quarter" idx="12"/>
-          </p:nvPr>
+          <p:cNvSpPr txBox="1"/>
+          <p:nvPr/>
         </p:nvSpPr>
         <p:spPr>
           <a:xfrm>
-            <a:off x="10807995" y="6356350"/>
-            <a:ext cx="723014" cy="365125"/>
+            <a:off x="6502428" y="5676987"/>
+            <a:ext cx="839925" cy="369332"/>
           </a:xfrm>
+          <a:prstGeom prst="rect">
+            <a:avLst/>
+          </a:prstGeom>
+          <a:noFill/>
         </p:spPr>
         <p:txBody>
-          <a:bodyPr vert="horz" lIns="91440" tIns="45720" rIns="91440" bIns="45720" rtlCol="0" anchor="ctr">
-            <a:normAutofit/>
+          <a:bodyPr wrap="square" rtlCol="0">
+            <a:spAutoFit/>
           </a:bodyPr>
           <a:lstStyle/>
           <a:p>
-            <a:pPr defTabSz="914400">
-              <a:spcAft>
-                <a:spcPts val="600"/>
-              </a:spcAft>
-            </a:pPr>
-            <a:fld id="{70C12960-6E85-460F-B6E3-5B82CB31AF3D}" type="slidenum">
-              <a:rPr lang="en-US" smtClean="0"/>
-              <a:pPr defTabSz="914400">
-                <a:spcAft>
-                  <a:spcPts val="600"/>
-                </a:spcAft>
-              </a:pPr>
-              <a:t>13</a:t>
-            </a:fld>
-            <a:endParaRPr lang="en-US"/>
+            <a:r>
+              <a:rPr lang="en-US" dirty="0"/>
+              <a:t>-10.2</a:t>
+            </a:r>
+          </a:p>
+        </p:txBody>
+      </p:sp>
+      <p:sp>
+        <p:nvSpPr>
+          <p:cNvPr id="63" name="TextBox 62">
+            <a:extLst>
+              <a:ext uri="{FF2B5EF4-FFF2-40B4-BE49-F238E27FC236}">
+                <a16:creationId xmlns:a16="http://schemas.microsoft.com/office/drawing/2014/main" id="{CCC62435-7ED0-C763-E063-59C0FD6BB2B3}"/>
+              </a:ext>
+            </a:extLst>
+          </p:cNvPr>
+          <p:cNvSpPr txBox="1"/>
+          <p:nvPr/>
+        </p:nvSpPr>
+        <p:spPr>
+          <a:xfrm>
+            <a:off x="7882367" y="5676987"/>
+            <a:ext cx="839925" cy="369332"/>
+          </a:xfrm>
+          <a:prstGeom prst="rect">
+            <a:avLst/>
+          </a:prstGeom>
+          <a:noFill/>
+        </p:spPr>
+        <p:txBody>
+          <a:bodyPr wrap="square" rtlCol="0">
+            <a:spAutoFit/>
+          </a:bodyPr>
+          <a:lstStyle/>
+          <a:p>
+            <a:r>
+              <a:rPr lang="en-US" dirty="0"/>
+              <a:t>-5.7</a:t>
+            </a:r>
+          </a:p>
+        </p:txBody>
+      </p:sp>
+      <p:sp>
+        <p:nvSpPr>
+          <p:cNvPr id="64" name="TextBox 63">
+            <a:extLst>
+              <a:ext uri="{FF2B5EF4-FFF2-40B4-BE49-F238E27FC236}">
+                <a16:creationId xmlns:a16="http://schemas.microsoft.com/office/drawing/2014/main" id="{21D8FB2D-E87E-0833-427D-FA5EF69C704A}"/>
+              </a:ext>
+            </a:extLst>
+          </p:cNvPr>
+          <p:cNvSpPr txBox="1"/>
+          <p:nvPr/>
+        </p:nvSpPr>
+        <p:spPr>
+          <a:xfrm>
+            <a:off x="9377337" y="5682767"/>
+            <a:ext cx="839925" cy="369332"/>
+          </a:xfrm>
+          <a:prstGeom prst="rect">
+            <a:avLst/>
+          </a:prstGeom>
+          <a:noFill/>
+        </p:spPr>
+        <p:txBody>
+          <a:bodyPr wrap="square" rtlCol="0">
+            <a:spAutoFit/>
+          </a:bodyPr>
+          <a:lstStyle/>
+          <a:p>
+            <a:r>
+              <a:rPr lang="en-US" dirty="0"/>
+              <a:t>2.8</a:t>
+            </a:r>
+          </a:p>
+        </p:txBody>
+      </p:sp>
+      <p:sp>
+        <p:nvSpPr>
+          <p:cNvPr id="65" name="TextBox 64">
+            <a:extLst>
+              <a:ext uri="{FF2B5EF4-FFF2-40B4-BE49-F238E27FC236}">
+                <a16:creationId xmlns:a16="http://schemas.microsoft.com/office/drawing/2014/main" id="{E500F8E8-FFBB-B94F-9131-ABFF76B9652A}"/>
+              </a:ext>
+            </a:extLst>
+          </p:cNvPr>
+          <p:cNvSpPr txBox="1"/>
+          <p:nvPr/>
+        </p:nvSpPr>
+        <p:spPr>
+          <a:xfrm>
+            <a:off x="10691084" y="5696586"/>
+            <a:ext cx="839925" cy="369332"/>
+          </a:xfrm>
+          <a:prstGeom prst="rect">
+            <a:avLst/>
+          </a:prstGeom>
+          <a:noFill/>
+        </p:spPr>
+        <p:txBody>
+          <a:bodyPr wrap="square" rtlCol="0">
+            <a:spAutoFit/>
+          </a:bodyPr>
+          <a:lstStyle/>
+          <a:p>
+            <a:r>
+              <a:rPr lang="en-US" dirty="0"/>
+              <a:t>51.9</a:t>
+            </a:r>
+          </a:p>
+        </p:txBody>
+      </p:sp>
+      <p:sp>
+        <p:nvSpPr>
+          <p:cNvPr id="66" name="TextBox 65">
+            <a:extLst>
+              <a:ext uri="{FF2B5EF4-FFF2-40B4-BE49-F238E27FC236}">
+                <a16:creationId xmlns:a16="http://schemas.microsoft.com/office/drawing/2014/main" id="{F219A76B-F502-A2E6-ECA0-45FA916DEE38}"/>
+              </a:ext>
+            </a:extLst>
+          </p:cNvPr>
+          <p:cNvSpPr txBox="1"/>
+          <p:nvPr/>
+        </p:nvSpPr>
+        <p:spPr>
+          <a:xfrm>
+            <a:off x="5009009" y="5676987"/>
+            <a:ext cx="839925" cy="369332"/>
+          </a:xfrm>
+          <a:prstGeom prst="rect">
+            <a:avLst/>
+          </a:prstGeom>
+          <a:noFill/>
+        </p:spPr>
+        <p:txBody>
+          <a:bodyPr wrap="square" rtlCol="0">
+            <a:spAutoFit/>
+          </a:bodyPr>
+          <a:lstStyle/>
+          <a:p>
+            <a:r>
+              <a:rPr lang="en-US" dirty="0"/>
+              <a:t>116.6</a:t>
+            </a:r>
+          </a:p>
+        </p:txBody>
+      </p:sp>
+      <p:sp>
+        <p:nvSpPr>
+          <p:cNvPr id="67" name="TextBox 66">
+            <a:extLst>
+              <a:ext uri="{FF2B5EF4-FFF2-40B4-BE49-F238E27FC236}">
+                <a16:creationId xmlns:a16="http://schemas.microsoft.com/office/drawing/2014/main" id="{DA19FD72-2D76-03F5-BB40-E398B38CBD4C}"/>
+              </a:ext>
+            </a:extLst>
+          </p:cNvPr>
+          <p:cNvSpPr txBox="1"/>
+          <p:nvPr/>
+        </p:nvSpPr>
+        <p:spPr>
+          <a:xfrm>
+            <a:off x="3753854" y="5696586"/>
+            <a:ext cx="839925" cy="369332"/>
+          </a:xfrm>
+          <a:prstGeom prst="rect">
+            <a:avLst/>
+          </a:prstGeom>
+          <a:noFill/>
+        </p:spPr>
+        <p:txBody>
+          <a:bodyPr wrap="square" rtlCol="0">
+            <a:spAutoFit/>
+          </a:bodyPr>
+          <a:lstStyle/>
+          <a:p>
+            <a:r>
+              <a:rPr lang="en-US" dirty="0"/>
+              <a:t>25.4</a:t>
+            </a:r>
+          </a:p>
+        </p:txBody>
+      </p:sp>
+      <p:sp>
+        <p:nvSpPr>
+          <p:cNvPr id="68" name="TextBox 67">
+            <a:extLst>
+              <a:ext uri="{FF2B5EF4-FFF2-40B4-BE49-F238E27FC236}">
+                <a16:creationId xmlns:a16="http://schemas.microsoft.com/office/drawing/2014/main" id="{411E415D-A966-7D9A-74CF-0AE22D95F26C}"/>
+              </a:ext>
+            </a:extLst>
+          </p:cNvPr>
+          <p:cNvSpPr txBox="1"/>
+          <p:nvPr/>
+        </p:nvSpPr>
+        <p:spPr>
+          <a:xfrm>
+            <a:off x="2240271" y="5702649"/>
+            <a:ext cx="839925" cy="369332"/>
+          </a:xfrm>
+          <a:prstGeom prst="rect">
+            <a:avLst/>
+          </a:prstGeom>
+          <a:noFill/>
+        </p:spPr>
+        <p:txBody>
+          <a:bodyPr wrap="square" rtlCol="0">
+            <a:spAutoFit/>
+          </a:bodyPr>
+          <a:lstStyle/>
+          <a:p>
+            <a:r>
+              <a:rPr lang="en-US" dirty="0"/>
+              <a:t>25.7</a:t>
+            </a:r>
+          </a:p>
+        </p:txBody>
+      </p:sp>
+      <p:sp>
+        <p:nvSpPr>
+          <p:cNvPr id="69" name="TextBox 68">
+            <a:extLst>
+              <a:ext uri="{FF2B5EF4-FFF2-40B4-BE49-F238E27FC236}">
+                <a16:creationId xmlns:a16="http://schemas.microsoft.com/office/drawing/2014/main" id="{0DF01F00-8E31-1062-D0EF-6A3A55050957}"/>
+              </a:ext>
+            </a:extLst>
+          </p:cNvPr>
+          <p:cNvSpPr txBox="1"/>
+          <p:nvPr/>
+        </p:nvSpPr>
+        <p:spPr>
+          <a:xfrm>
+            <a:off x="847875" y="5676987"/>
+            <a:ext cx="839925" cy="369332"/>
+          </a:xfrm>
+          <a:prstGeom prst="rect">
+            <a:avLst/>
+          </a:prstGeom>
+          <a:noFill/>
+        </p:spPr>
+        <p:txBody>
+          <a:bodyPr wrap="square" rtlCol="0">
+            <a:spAutoFit/>
+          </a:bodyPr>
+          <a:lstStyle/>
+          <a:p>
+            <a:r>
+              <a:rPr lang="en-US" dirty="0"/>
+              <a:t>102.7</a:t>
+            </a:r>
+          </a:p>
+        </p:txBody>
+      </p:sp>
+      <p:sp>
+        <p:nvSpPr>
+          <p:cNvPr id="70" name="TextBox 69">
+            <a:extLst>
+              <a:ext uri="{FF2B5EF4-FFF2-40B4-BE49-F238E27FC236}">
+                <a16:creationId xmlns:a16="http://schemas.microsoft.com/office/drawing/2014/main" id="{8464F63C-35C5-DD23-DCFA-89E6428BCD15}"/>
+              </a:ext>
+            </a:extLst>
+          </p:cNvPr>
+          <p:cNvSpPr txBox="1"/>
+          <p:nvPr/>
+        </p:nvSpPr>
+        <p:spPr>
+          <a:xfrm>
+            <a:off x="708247" y="4826699"/>
+            <a:ext cx="977198" cy="369332"/>
+          </a:xfrm>
+          <a:prstGeom prst="rect">
+            <a:avLst/>
+          </a:prstGeom>
+          <a:noFill/>
+        </p:spPr>
+        <p:txBody>
+          <a:bodyPr wrap="square" rtlCol="0">
+            <a:spAutoFit/>
+          </a:bodyPr>
+          <a:lstStyle/>
+          <a:p>
+            <a:r>
+              <a:rPr lang="en-US" dirty="0"/>
+              <a:t>Female</a:t>
+            </a:r>
+          </a:p>
+        </p:txBody>
+      </p:sp>
+      <p:sp>
+        <p:nvSpPr>
+          <p:cNvPr id="71" name="TextBox 70">
+            <a:extLst>
+              <a:ext uri="{FF2B5EF4-FFF2-40B4-BE49-F238E27FC236}">
+                <a16:creationId xmlns:a16="http://schemas.microsoft.com/office/drawing/2014/main" id="{15C57FAD-A893-8407-B1B9-1553AD8589EE}"/>
+              </a:ext>
+            </a:extLst>
+          </p:cNvPr>
+          <p:cNvSpPr txBox="1"/>
+          <p:nvPr/>
+        </p:nvSpPr>
+        <p:spPr>
+          <a:xfrm>
+            <a:off x="2146787" y="4826699"/>
+            <a:ext cx="839925" cy="369332"/>
+          </a:xfrm>
+          <a:prstGeom prst="rect">
+            <a:avLst/>
+          </a:prstGeom>
+          <a:noFill/>
+        </p:spPr>
+        <p:txBody>
+          <a:bodyPr wrap="square" rtlCol="0">
+            <a:spAutoFit/>
+          </a:bodyPr>
+          <a:lstStyle/>
+          <a:p>
+            <a:r>
+              <a:rPr lang="en-US" dirty="0"/>
+              <a:t>Male</a:t>
+            </a:r>
+          </a:p>
+        </p:txBody>
+      </p:sp>
+      <p:sp>
+        <p:nvSpPr>
+          <p:cNvPr id="72" name="TextBox 71">
+            <a:extLst>
+              <a:ext uri="{FF2B5EF4-FFF2-40B4-BE49-F238E27FC236}">
+                <a16:creationId xmlns:a16="http://schemas.microsoft.com/office/drawing/2014/main" id="{C8C582E7-1C6D-F96C-41BA-62DE69A2F64A}"/>
+              </a:ext>
+            </a:extLst>
+          </p:cNvPr>
+          <p:cNvSpPr txBox="1"/>
+          <p:nvPr/>
+        </p:nvSpPr>
+        <p:spPr>
+          <a:xfrm>
+            <a:off x="3680439" y="4846458"/>
+            <a:ext cx="839925" cy="369332"/>
+          </a:xfrm>
+          <a:prstGeom prst="rect">
+            <a:avLst/>
+          </a:prstGeom>
+          <a:noFill/>
+        </p:spPr>
+        <p:txBody>
+          <a:bodyPr wrap="square" rtlCol="0">
+            <a:spAutoFit/>
+          </a:bodyPr>
+          <a:lstStyle/>
+          <a:p>
+            <a:r>
+              <a:rPr lang="en-US" dirty="0"/>
+              <a:t>&lt; 17</a:t>
+            </a:r>
+          </a:p>
+        </p:txBody>
+      </p:sp>
+      <p:sp>
+        <p:nvSpPr>
+          <p:cNvPr id="73" name="TextBox 72">
+            <a:extLst>
+              <a:ext uri="{FF2B5EF4-FFF2-40B4-BE49-F238E27FC236}">
+                <a16:creationId xmlns:a16="http://schemas.microsoft.com/office/drawing/2014/main" id="{710A6155-F202-6E65-E5F5-2695B072435D}"/>
+              </a:ext>
+            </a:extLst>
+          </p:cNvPr>
+          <p:cNvSpPr txBox="1"/>
+          <p:nvPr/>
+        </p:nvSpPr>
+        <p:spPr>
+          <a:xfrm>
+            <a:off x="4951931" y="4826699"/>
+            <a:ext cx="839925" cy="369332"/>
+          </a:xfrm>
+          <a:prstGeom prst="rect">
+            <a:avLst/>
+          </a:prstGeom>
+          <a:noFill/>
+        </p:spPr>
+        <p:txBody>
+          <a:bodyPr wrap="square" rtlCol="0">
+            <a:spAutoFit/>
+          </a:bodyPr>
+          <a:lstStyle/>
+          <a:p>
+            <a:r>
+              <a:rPr lang="en-US" dirty="0"/>
+              <a:t>&gt;= 17</a:t>
+            </a:r>
+          </a:p>
+        </p:txBody>
+      </p:sp>
+      <p:sp>
+        <p:nvSpPr>
+          <p:cNvPr id="74" name="TextBox 73">
+            <a:extLst>
+              <a:ext uri="{FF2B5EF4-FFF2-40B4-BE49-F238E27FC236}">
+                <a16:creationId xmlns:a16="http://schemas.microsoft.com/office/drawing/2014/main" id="{6D16F19E-6B48-BCA5-6ABC-E033949888E7}"/>
+              </a:ext>
+            </a:extLst>
+          </p:cNvPr>
+          <p:cNvSpPr txBox="1"/>
+          <p:nvPr/>
+        </p:nvSpPr>
+        <p:spPr>
+          <a:xfrm>
+            <a:off x="6504685" y="4840293"/>
+            <a:ext cx="839925" cy="369332"/>
+          </a:xfrm>
+          <a:prstGeom prst="rect">
+            <a:avLst/>
+          </a:prstGeom>
+          <a:noFill/>
+        </p:spPr>
+        <p:txBody>
+          <a:bodyPr wrap="square" rtlCol="0">
+            <a:spAutoFit/>
+          </a:bodyPr>
+          <a:lstStyle/>
+          <a:p>
+            <a:r>
+              <a:rPr lang="en-US" dirty="0"/>
+              <a:t>&lt;= 9th</a:t>
+            </a:r>
+          </a:p>
+        </p:txBody>
+      </p:sp>
+      <p:sp>
+        <p:nvSpPr>
+          <p:cNvPr id="75" name="TextBox 74">
+            <a:extLst>
+              <a:ext uri="{FF2B5EF4-FFF2-40B4-BE49-F238E27FC236}">
+                <a16:creationId xmlns:a16="http://schemas.microsoft.com/office/drawing/2014/main" id="{525B6A40-C465-ED8F-5B7D-443F512BFC8F}"/>
+              </a:ext>
+            </a:extLst>
+          </p:cNvPr>
+          <p:cNvSpPr txBox="1"/>
+          <p:nvPr/>
+        </p:nvSpPr>
+        <p:spPr>
+          <a:xfrm>
+            <a:off x="7798633" y="4813343"/>
+            <a:ext cx="839925" cy="369332"/>
+          </a:xfrm>
+          <a:prstGeom prst="rect">
+            <a:avLst/>
+          </a:prstGeom>
+          <a:noFill/>
+        </p:spPr>
+        <p:txBody>
+          <a:bodyPr wrap="square" rtlCol="0">
+            <a:spAutoFit/>
+          </a:bodyPr>
+          <a:lstStyle/>
+          <a:p>
+            <a:r>
+              <a:rPr lang="en-US" dirty="0"/>
+              <a:t>&gt; 9th</a:t>
+            </a:r>
+          </a:p>
+        </p:txBody>
+      </p:sp>
+      <p:sp>
+        <p:nvSpPr>
+          <p:cNvPr id="76" name="TextBox 75">
+            <a:extLst>
+              <a:ext uri="{FF2B5EF4-FFF2-40B4-BE49-F238E27FC236}">
+                <a16:creationId xmlns:a16="http://schemas.microsoft.com/office/drawing/2014/main" id="{8871A75E-0B44-C868-FF0E-03D2DD9BC5C5}"/>
+              </a:ext>
+            </a:extLst>
+          </p:cNvPr>
+          <p:cNvSpPr txBox="1"/>
+          <p:nvPr/>
+        </p:nvSpPr>
+        <p:spPr>
+          <a:xfrm>
+            <a:off x="9210032" y="4811495"/>
+            <a:ext cx="920157" cy="369332"/>
+          </a:xfrm>
+          <a:prstGeom prst="rect">
+            <a:avLst/>
+          </a:prstGeom>
+          <a:noFill/>
+        </p:spPr>
+        <p:txBody>
+          <a:bodyPr wrap="square" rtlCol="0">
+            <a:spAutoFit/>
+          </a:bodyPr>
+          <a:lstStyle/>
+          <a:p>
+            <a:r>
+              <a:rPr lang="en-US" dirty="0"/>
+              <a:t>A, B, C</a:t>
+            </a:r>
+          </a:p>
+        </p:txBody>
+      </p:sp>
+      <p:sp>
+        <p:nvSpPr>
+          <p:cNvPr id="77" name="TextBox 76">
+            <a:extLst>
+              <a:ext uri="{FF2B5EF4-FFF2-40B4-BE49-F238E27FC236}">
+                <a16:creationId xmlns:a16="http://schemas.microsoft.com/office/drawing/2014/main" id="{84CAA1CE-2682-54B9-892F-D41EAF3C7C8B}"/>
+              </a:ext>
+            </a:extLst>
+          </p:cNvPr>
+          <p:cNvSpPr txBox="1"/>
+          <p:nvPr/>
+        </p:nvSpPr>
+        <p:spPr>
+          <a:xfrm>
+            <a:off x="10611941" y="4731503"/>
+            <a:ext cx="839925" cy="646331"/>
+          </a:xfrm>
+          <a:prstGeom prst="rect">
+            <a:avLst/>
+          </a:prstGeom>
+          <a:noFill/>
+        </p:spPr>
+        <p:txBody>
+          <a:bodyPr wrap="square" rtlCol="0">
+            <a:spAutoFit/>
+          </a:bodyPr>
+          <a:lstStyle/>
+          <a:p>
+            <a:r>
+              <a:rPr lang="en-US" dirty="0"/>
+              <a:t>D or lower</a:t>
+            </a:r>
+          </a:p>
+        </p:txBody>
+      </p:sp>
+      <p:sp>
+        <p:nvSpPr>
+          <p:cNvPr id="78" name="TextBox 77">
+            <a:extLst>
+              <a:ext uri="{FF2B5EF4-FFF2-40B4-BE49-F238E27FC236}">
+                <a16:creationId xmlns:a16="http://schemas.microsoft.com/office/drawing/2014/main" id="{5C15A0A9-00F0-124E-853C-1759D369A949}"/>
+              </a:ext>
+            </a:extLst>
+          </p:cNvPr>
+          <p:cNvSpPr txBox="1"/>
+          <p:nvPr/>
+        </p:nvSpPr>
+        <p:spPr>
+          <a:xfrm>
+            <a:off x="10388032" y="2582604"/>
+            <a:ext cx="839925" cy="369332"/>
+          </a:xfrm>
+          <a:prstGeom prst="rect">
+            <a:avLst/>
+          </a:prstGeom>
+          <a:noFill/>
+        </p:spPr>
+        <p:txBody>
+          <a:bodyPr wrap="square" rtlCol="0">
+            <a:spAutoFit/>
+          </a:bodyPr>
+          <a:lstStyle/>
+          <a:p>
+            <a:r>
+              <a:rPr lang="en-US" dirty="0"/>
+              <a:t>&gt;= 6</a:t>
+            </a:r>
+          </a:p>
+        </p:txBody>
+      </p:sp>
+      <p:sp>
+        <p:nvSpPr>
+          <p:cNvPr id="79" name="TextBox 78">
+            <a:extLst>
+              <a:ext uri="{FF2B5EF4-FFF2-40B4-BE49-F238E27FC236}">
+                <a16:creationId xmlns:a16="http://schemas.microsoft.com/office/drawing/2014/main" id="{81B8FE2B-274C-780D-E1C5-A90AEF0BE175}"/>
+              </a:ext>
+            </a:extLst>
+          </p:cNvPr>
+          <p:cNvSpPr txBox="1"/>
+          <p:nvPr/>
+        </p:nvSpPr>
+        <p:spPr>
+          <a:xfrm>
+            <a:off x="6907031" y="2586991"/>
+            <a:ext cx="839925" cy="369332"/>
+          </a:xfrm>
+          <a:prstGeom prst="rect">
+            <a:avLst/>
+          </a:prstGeom>
+          <a:noFill/>
+        </p:spPr>
+        <p:txBody>
+          <a:bodyPr wrap="square" rtlCol="0">
+            <a:spAutoFit/>
+          </a:bodyPr>
+          <a:lstStyle/>
+          <a:p>
+            <a:r>
+              <a:rPr lang="en-US" dirty="0"/>
+              <a:t>&lt; 6</a:t>
+            </a:r>
+          </a:p>
+        </p:txBody>
+      </p:sp>
+      <p:sp>
+        <p:nvSpPr>
+          <p:cNvPr id="80" name="TextBox 79">
+            <a:extLst>
+              <a:ext uri="{FF2B5EF4-FFF2-40B4-BE49-F238E27FC236}">
+                <a16:creationId xmlns:a16="http://schemas.microsoft.com/office/drawing/2014/main" id="{F4666C95-66F0-C84A-D67A-B8E3D0161195}"/>
+              </a:ext>
+            </a:extLst>
+          </p:cNvPr>
+          <p:cNvSpPr txBox="1"/>
+          <p:nvPr/>
+        </p:nvSpPr>
+        <p:spPr>
+          <a:xfrm>
+            <a:off x="4929592" y="2583028"/>
+            <a:ext cx="839925" cy="369332"/>
+          </a:xfrm>
+          <a:prstGeom prst="rect">
+            <a:avLst/>
+          </a:prstGeom>
+          <a:noFill/>
+        </p:spPr>
+        <p:txBody>
+          <a:bodyPr wrap="square" rtlCol="0">
+            <a:spAutoFit/>
+          </a:bodyPr>
+          <a:lstStyle/>
+          <a:p>
+            <a:r>
+              <a:rPr lang="en-US" dirty="0"/>
+              <a:t>Yes</a:t>
+            </a:r>
+          </a:p>
+        </p:txBody>
+      </p:sp>
+      <p:sp>
+        <p:nvSpPr>
+          <p:cNvPr id="81" name="TextBox 80">
+            <a:extLst>
+              <a:ext uri="{FF2B5EF4-FFF2-40B4-BE49-F238E27FC236}">
+                <a16:creationId xmlns:a16="http://schemas.microsoft.com/office/drawing/2014/main" id="{89C7B4FA-AE9E-DDF2-50C2-FD9973938A71}"/>
+              </a:ext>
+            </a:extLst>
+          </p:cNvPr>
+          <p:cNvSpPr txBox="1"/>
+          <p:nvPr/>
+        </p:nvSpPr>
+        <p:spPr>
+          <a:xfrm>
+            <a:off x="7709321" y="682962"/>
+            <a:ext cx="2507941" cy="646331"/>
+          </a:xfrm>
+          <a:prstGeom prst="rect">
+            <a:avLst/>
+          </a:prstGeom>
+          <a:noFill/>
+        </p:spPr>
+        <p:txBody>
+          <a:bodyPr wrap="square" rtlCol="0">
+            <a:spAutoFit/>
+          </a:bodyPr>
+          <a:lstStyle/>
+          <a:p>
+            <a:r>
+              <a:rPr lang="en-US" dirty="0"/>
+              <a:t>Strongly/somewhat disapprove</a:t>
+            </a:r>
+          </a:p>
+        </p:txBody>
+      </p:sp>
+      <p:sp>
+        <p:nvSpPr>
+          <p:cNvPr id="82" name="TextBox 81">
+            <a:extLst>
+              <a:ext uri="{FF2B5EF4-FFF2-40B4-BE49-F238E27FC236}">
+                <a16:creationId xmlns:a16="http://schemas.microsoft.com/office/drawing/2014/main" id="{E0DF2B91-71E5-0624-8AF0-8CAEBE74D075}"/>
+              </a:ext>
+            </a:extLst>
+          </p:cNvPr>
+          <p:cNvSpPr txBox="1"/>
+          <p:nvPr/>
+        </p:nvSpPr>
+        <p:spPr>
+          <a:xfrm>
+            <a:off x="2427355" y="685716"/>
+            <a:ext cx="2433381" cy="646331"/>
+          </a:xfrm>
+          <a:prstGeom prst="rect">
+            <a:avLst/>
+          </a:prstGeom>
+          <a:noFill/>
+        </p:spPr>
+        <p:txBody>
+          <a:bodyPr wrap="square" rtlCol="0">
+            <a:spAutoFit/>
+          </a:bodyPr>
+          <a:lstStyle/>
+          <a:p>
+            <a:r>
+              <a:rPr lang="en-US" dirty="0"/>
+              <a:t>Neither approve nor disapprove</a:t>
+            </a:r>
+          </a:p>
+        </p:txBody>
+      </p:sp>
+      <p:sp>
+        <p:nvSpPr>
+          <p:cNvPr id="83" name="TextBox 82">
+            <a:extLst>
+              <a:ext uri="{FF2B5EF4-FFF2-40B4-BE49-F238E27FC236}">
+                <a16:creationId xmlns:a16="http://schemas.microsoft.com/office/drawing/2014/main" id="{26C476CE-B368-63F1-79B2-1B1B5D2064F4}"/>
+              </a:ext>
+            </a:extLst>
+          </p:cNvPr>
+          <p:cNvSpPr txBox="1"/>
+          <p:nvPr/>
+        </p:nvSpPr>
+        <p:spPr>
+          <a:xfrm>
+            <a:off x="1253992" y="2586991"/>
+            <a:ext cx="839925" cy="369332"/>
+          </a:xfrm>
+          <a:prstGeom prst="rect">
+            <a:avLst/>
+          </a:prstGeom>
+          <a:noFill/>
+        </p:spPr>
+        <p:txBody>
+          <a:bodyPr wrap="square" rtlCol="0">
+            <a:spAutoFit/>
+          </a:bodyPr>
+          <a:lstStyle/>
+          <a:p>
+            <a:r>
+              <a:rPr lang="en-US" dirty="0"/>
+              <a:t>No</a:t>
+            </a:r>
+          </a:p>
+        </p:txBody>
+      </p:sp>
+      <p:sp>
+        <p:nvSpPr>
+          <p:cNvPr id="87" name="TextBox 86">
+            <a:extLst>
+              <a:ext uri="{FF2B5EF4-FFF2-40B4-BE49-F238E27FC236}">
+                <a16:creationId xmlns:a16="http://schemas.microsoft.com/office/drawing/2014/main" id="{CE90D124-1698-F6A5-397D-4AA6B3132E70}"/>
+              </a:ext>
+            </a:extLst>
+          </p:cNvPr>
+          <p:cNvSpPr txBox="1"/>
+          <p:nvPr/>
+        </p:nvSpPr>
+        <p:spPr>
+          <a:xfrm>
+            <a:off x="1997504" y="106316"/>
+            <a:ext cx="8521429" cy="369332"/>
+          </a:xfrm>
+          <a:prstGeom prst="rect">
+            <a:avLst/>
+          </a:prstGeom>
+          <a:noFill/>
+        </p:spPr>
+        <p:txBody>
+          <a:bodyPr wrap="square" rtlCol="0">
+            <a:spAutoFit/>
+          </a:bodyPr>
+          <a:lstStyle/>
+          <a:p>
+            <a:r>
+              <a:rPr lang="en-US" b="1" dirty="0"/>
+              <a:t>Gradient Boost Regressor for Youth Marijuana Use in the Past Year (First Tree)</a:t>
+            </a:r>
           </a:p>
         </p:txBody>
       </p:sp>
     </p:spTree>
     <p:extLst>
       <p:ext uri="{BB962C8B-B14F-4D97-AF65-F5344CB8AC3E}">
-        <p14:creationId xmlns:p14="http://schemas.microsoft.com/office/powerpoint/2010/main" val="3480897458"/>
+        <p14:creationId xmlns:p14="http://schemas.microsoft.com/office/powerpoint/2010/main" val="2572550141"/>
       </p:ext>
     </p:extLst>
   </p:cSld>

</xml_diff>